<commit_message>
Updates in Architecture diagrams
</commit_message>
<xml_diff>
--- a/docs/simplified-directions/Prototype-Architecture-Diagrams.pptx
+++ b/docs/simplified-directions/Prototype-Architecture-Diagrams.pptx
@@ -5,10 +5,11 @@
     <p:sldMasterId id="2147483648" r:id="rId1"/>
   </p:sldMasterIdLst>
   <p:notesMasterIdLst>
-    <p:notesMasterId r:id="rId3"/>
+    <p:notesMasterId r:id="rId4"/>
   </p:notesMasterIdLst>
   <p:sldIdLst>
-    <p:sldId id="275" r:id="rId2"/>
+    <p:sldId id="276" r:id="rId2"/>
+    <p:sldId id="275" r:id="rId3"/>
   </p:sldIdLst>
   <p:sldSz cx="12192000" cy="6858000"/>
   <p:notesSz cx="6858000" cy="9144000"/>
@@ -197,7 +198,7 @@
           <a:p>
             <a:fld id="{17C0FFDD-2F91-4327-83DF-AC11DEFCAA33}" type="datetimeFigureOut">
               <a:rPr lang="en-US" smtClean="0"/>
-              <a:t>9/12/2025</a:t>
+              <a:t>9/15/2025</a:t>
             </a:fld>
             <a:endParaRPr lang="en-US"/>
           </a:p>
@@ -472,6 +473,181 @@
         <p:cNvPr id="1" name="">
           <a:extLst>
             <a:ext uri="{FF2B5EF4-FFF2-40B4-BE49-F238E27FC236}">
+              <a16:creationId xmlns:a16="http://schemas.microsoft.com/office/drawing/2014/main" id="{EDE4B02D-1099-0750-E53A-19E83318E91A}"/>
+            </a:ext>
+          </a:extLst>
+        </p:cNvPr>
+        <p:cNvGrpSpPr/>
+        <p:nvPr/>
+      </p:nvGrpSpPr>
+      <p:grpSpPr>
+        <a:xfrm>
+          <a:off x="0" y="0"/>
+          <a:ext cx="0" cy="0"/>
+          <a:chOff x="0" y="0"/>
+          <a:chExt cx="0" cy="0"/>
+        </a:xfrm>
+      </p:grpSpPr>
+      <p:sp>
+        <p:nvSpPr>
+          <p:cNvPr id="2" name="Slide Image Placeholder 1">
+            <a:extLst>
+              <a:ext uri="{FF2B5EF4-FFF2-40B4-BE49-F238E27FC236}">
+                <a16:creationId xmlns:a16="http://schemas.microsoft.com/office/drawing/2014/main" id="{C59D28F9-6476-9171-5625-2B44BFE35E16}"/>
+              </a:ext>
+            </a:extLst>
+          </p:cNvPr>
+          <p:cNvSpPr>
+            <a:spLocks noGrp="1" noRot="1" noChangeAspect="1"/>
+          </p:cNvSpPr>
+          <p:nvPr>
+            <p:ph type="sldImg"/>
+          </p:nvPr>
+        </p:nvSpPr>
+        <p:spPr/>
+        <p:txBody>
+          <a:bodyPr/>
+          <a:lstStyle/>
+          <a:p>
+            <a:endParaRPr lang="en-US"/>
+          </a:p>
+        </p:txBody>
+      </p:sp>
+      <p:sp>
+        <p:nvSpPr>
+          <p:cNvPr id="3" name="Notes Placeholder 2">
+            <a:extLst>
+              <a:ext uri="{FF2B5EF4-FFF2-40B4-BE49-F238E27FC236}">
+                <a16:creationId xmlns:a16="http://schemas.microsoft.com/office/drawing/2014/main" id="{BE19D7F5-6142-95EE-DBAC-516C0F7B9850}"/>
+              </a:ext>
+            </a:extLst>
+          </p:cNvPr>
+          <p:cNvSpPr>
+            <a:spLocks noGrp="1"/>
+          </p:cNvSpPr>
+          <p:nvPr>
+            <p:ph type="body" idx="1"/>
+          </p:nvPr>
+        </p:nvSpPr>
+        <p:spPr/>
+        <p:txBody>
+          <a:bodyPr/>
+          <a:lstStyle/>
+          <a:p>
+            <a:endParaRPr lang="en-US" dirty="0"/>
+          </a:p>
+        </p:txBody>
+      </p:sp>
+      <p:sp>
+        <p:nvSpPr>
+          <p:cNvPr id="4" name="Slide Number Placeholder 3">
+            <a:extLst>
+              <a:ext uri="{FF2B5EF4-FFF2-40B4-BE49-F238E27FC236}">
+                <a16:creationId xmlns:a16="http://schemas.microsoft.com/office/drawing/2014/main" id="{240515AC-4C13-BA48-F874-FB2AF59B6B18}"/>
+              </a:ext>
+            </a:extLst>
+          </p:cNvPr>
+          <p:cNvSpPr>
+            <a:spLocks noGrp="1"/>
+          </p:cNvSpPr>
+          <p:nvPr>
+            <p:ph type="sldNum" sz="quarter" idx="5"/>
+          </p:nvPr>
+        </p:nvSpPr>
+        <p:spPr/>
+        <p:txBody>
+          <a:bodyPr/>
+          <a:lstStyle/>
+          <a:p>
+            <a:pPr marL="0" marR="0" lvl="0" indent="0" algn="r" defTabSz="914400" rtl="0" eaLnBrk="1" fontAlgn="auto" latinLnBrk="0" hangingPunct="1">
+              <a:lnSpc>
+                <a:spcPct val="100000"/>
+              </a:lnSpc>
+              <a:spcBef>
+                <a:spcPts val="0"/>
+              </a:spcBef>
+              <a:spcAft>
+                <a:spcPts val="0"/>
+              </a:spcAft>
+              <a:buClrTx/>
+              <a:buSzTx/>
+              <a:buFontTx/>
+              <a:buNone/>
+              <a:tabLst/>
+              <a:defRPr/>
+            </a:pPr>
+            <a:fld id="{08BA0505-E843-4A21-A0D1-6C1CEE786CA8}" type="slidenum">
+              <a:rPr kumimoji="0" lang="en-US" sz="1200" b="0" i="0" u="none" strike="noStrike" kern="1200" cap="none" spc="0" normalizeH="0" baseline="0" noProof="0" smtClean="0">
+                <a:ln>
+                  <a:noFill/>
+                </a:ln>
+                <a:solidFill>
+                  <a:prstClr val="black"/>
+                </a:solidFill>
+                <a:effectLst/>
+                <a:uLnTx/>
+                <a:uFillTx/>
+                <a:latin typeface="Aptos" panose="02110004020202020204"/>
+                <a:ea typeface="+mn-ea"/>
+                <a:cs typeface="+mn-cs"/>
+              </a:rPr>
+              <a:pPr marL="0" marR="0" lvl="0" indent="0" algn="r" defTabSz="914400" rtl="0" eaLnBrk="1" fontAlgn="auto" latinLnBrk="0" hangingPunct="1">
+                <a:lnSpc>
+                  <a:spcPct val="100000"/>
+                </a:lnSpc>
+                <a:spcBef>
+                  <a:spcPts val="0"/>
+                </a:spcBef>
+                <a:spcAft>
+                  <a:spcPts val="0"/>
+                </a:spcAft>
+                <a:buClrTx/>
+                <a:buSzTx/>
+                <a:buFontTx/>
+                <a:buNone/>
+                <a:tabLst/>
+                <a:defRPr/>
+              </a:pPr>
+              <a:t>1</a:t>
+            </a:fld>
+            <a:endParaRPr kumimoji="0" lang="en-US" sz="1200" b="0" i="0" u="none" strike="noStrike" kern="1200" cap="none" spc="0" normalizeH="0" baseline="0" noProof="0">
+              <a:ln>
+                <a:noFill/>
+              </a:ln>
+              <a:solidFill>
+                <a:prstClr val="black"/>
+              </a:solidFill>
+              <a:effectLst/>
+              <a:uLnTx/>
+              <a:uFillTx/>
+              <a:latin typeface="Aptos" panose="02110004020202020204"/>
+              <a:ea typeface="+mn-ea"/>
+              <a:cs typeface="+mn-cs"/>
+            </a:endParaRPr>
+          </a:p>
+        </p:txBody>
+      </p:sp>
+    </p:spTree>
+    <p:extLst>
+      <p:ext uri="{BB962C8B-B14F-4D97-AF65-F5344CB8AC3E}">
+        <p14:creationId xmlns:p14="http://schemas.microsoft.com/office/powerpoint/2010/main" val="2653528649"/>
+      </p:ext>
+    </p:extLst>
+  </p:cSld>
+  <p:clrMapOvr>
+    <a:masterClrMapping/>
+  </p:clrMapOvr>
+</p:notes>
+</file>
+
+<file path=ppt/notesSlides/notesSlide2.xml><?xml version="1.0" encoding="utf-8"?>
+<p:notes xmlns:a="http://schemas.openxmlformats.org/drawingml/2006/main" xmlns:r="http://schemas.openxmlformats.org/officeDocument/2006/relationships" xmlns:p="http://schemas.openxmlformats.org/presentationml/2006/main">
+  <p:cSld>
+    <p:spTree>
+      <p:nvGrpSpPr>
+        <p:cNvPr id="1" name="">
+          <a:extLst>
+            <a:ext uri="{FF2B5EF4-FFF2-40B4-BE49-F238E27FC236}">
               <a16:creationId xmlns:a16="http://schemas.microsoft.com/office/drawing/2014/main" id="{4B82CB34-E852-E628-3160-F34C6D97CF2E}"/>
             </a:ext>
           </a:extLst>
@@ -504,6 +680,13 @@
           </p:nvPr>
         </p:nvSpPr>
         <p:spPr/>
+        <p:txBody>
+          <a:bodyPr/>
+          <a:lstStyle/>
+          <a:p>
+            <a:endParaRPr lang="en-US"/>
+          </a:p>
+        </p:txBody>
       </p:sp>
       <p:sp>
         <p:nvSpPr>
@@ -553,7 +736,7 @@
           <a:p>
             <a:fld id="{08BA0505-E843-4A21-A0D1-6C1CEE786CA8}" type="slidenum">
               <a:rPr lang="en-US" smtClean="0"/>
-              <a:t>1</a:t>
+              <a:t>2</a:t>
             </a:fld>
             <a:endParaRPr lang="en-US"/>
           </a:p>
@@ -719,7 +902,7 @@
           <a:p>
             <a:fld id="{F3562317-0748-4C3E-8EEC-4AF870B98677}" type="datetimeFigureOut">
               <a:rPr lang="en-US" smtClean="0"/>
-              <a:t>9/12/2025</a:t>
+              <a:t>9/15/2025</a:t>
             </a:fld>
             <a:endParaRPr lang="en-US"/>
           </a:p>
@@ -917,7 +1100,7 @@
           <a:p>
             <a:fld id="{F3562317-0748-4C3E-8EEC-4AF870B98677}" type="datetimeFigureOut">
               <a:rPr lang="en-US" smtClean="0"/>
-              <a:t>9/12/2025</a:t>
+              <a:t>9/15/2025</a:t>
             </a:fld>
             <a:endParaRPr lang="en-US"/>
           </a:p>
@@ -1125,7 +1308,7 @@
           <a:p>
             <a:fld id="{F3562317-0748-4C3E-8EEC-4AF870B98677}" type="datetimeFigureOut">
               <a:rPr lang="en-US" smtClean="0"/>
-              <a:t>9/12/2025</a:t>
+              <a:t>9/15/2025</a:t>
             </a:fld>
             <a:endParaRPr lang="en-US"/>
           </a:p>
@@ -1323,7 +1506,7 @@
           <a:p>
             <a:fld id="{F3562317-0748-4C3E-8EEC-4AF870B98677}" type="datetimeFigureOut">
               <a:rPr lang="en-US" smtClean="0"/>
-              <a:t>9/12/2025</a:t>
+              <a:t>9/15/2025</a:t>
             </a:fld>
             <a:endParaRPr lang="en-US"/>
           </a:p>
@@ -1598,7 +1781,7 @@
           <a:p>
             <a:fld id="{F3562317-0748-4C3E-8EEC-4AF870B98677}" type="datetimeFigureOut">
               <a:rPr lang="en-US" smtClean="0"/>
-              <a:t>9/12/2025</a:t>
+              <a:t>9/15/2025</a:t>
             </a:fld>
             <a:endParaRPr lang="en-US"/>
           </a:p>
@@ -1863,7 +2046,7 @@
           <a:p>
             <a:fld id="{F3562317-0748-4C3E-8EEC-4AF870B98677}" type="datetimeFigureOut">
               <a:rPr lang="en-US" smtClean="0"/>
-              <a:t>9/12/2025</a:t>
+              <a:t>9/15/2025</a:t>
             </a:fld>
             <a:endParaRPr lang="en-US"/>
           </a:p>
@@ -2275,7 +2458,7 @@
           <a:p>
             <a:fld id="{F3562317-0748-4C3E-8EEC-4AF870B98677}" type="datetimeFigureOut">
               <a:rPr lang="en-US" smtClean="0"/>
-              <a:t>9/12/2025</a:t>
+              <a:t>9/15/2025</a:t>
             </a:fld>
             <a:endParaRPr lang="en-US"/>
           </a:p>
@@ -2416,7 +2599,7 @@
           <a:p>
             <a:fld id="{F3562317-0748-4C3E-8EEC-4AF870B98677}" type="datetimeFigureOut">
               <a:rPr lang="en-US" smtClean="0"/>
-              <a:t>9/12/2025</a:t>
+              <a:t>9/15/2025</a:t>
             </a:fld>
             <a:endParaRPr lang="en-US"/>
           </a:p>
@@ -2529,7 +2712,7 @@
           <a:p>
             <a:fld id="{F3562317-0748-4C3E-8EEC-4AF870B98677}" type="datetimeFigureOut">
               <a:rPr lang="en-US" smtClean="0"/>
-              <a:t>9/12/2025</a:t>
+              <a:t>9/15/2025</a:t>
             </a:fld>
             <a:endParaRPr lang="en-US"/>
           </a:p>
@@ -2840,7 +3023,7 @@
           <a:p>
             <a:fld id="{F3562317-0748-4C3E-8EEC-4AF870B98677}" type="datetimeFigureOut">
               <a:rPr lang="en-US" smtClean="0"/>
-              <a:t>9/12/2025</a:t>
+              <a:t>9/15/2025</a:t>
             </a:fld>
             <a:endParaRPr lang="en-US"/>
           </a:p>
@@ -3128,7 +3311,7 @@
           <a:p>
             <a:fld id="{F3562317-0748-4C3E-8EEC-4AF870B98677}" type="datetimeFigureOut">
               <a:rPr lang="en-US" smtClean="0"/>
-              <a:t>9/12/2025</a:t>
+              <a:t>9/15/2025</a:t>
             </a:fld>
             <a:endParaRPr lang="en-US"/>
           </a:p>
@@ -3369,7 +3552,7 @@
           <a:p>
             <a:fld id="{F3562317-0748-4C3E-8EEC-4AF870B98677}" type="datetimeFigureOut">
               <a:rPr lang="en-US" smtClean="0"/>
-              <a:t>9/12/2025</a:t>
+              <a:t>9/15/2025</a:t>
             </a:fld>
             <a:endParaRPr lang="en-US"/>
           </a:p>
@@ -3777,6 +3960,2976 @@
         <p:cNvPr id="1" name="">
           <a:extLst>
             <a:ext uri="{FF2B5EF4-FFF2-40B4-BE49-F238E27FC236}">
+              <a16:creationId xmlns:a16="http://schemas.microsoft.com/office/drawing/2014/main" id="{6E5C599B-9632-CFC4-257F-309AC14A0E5F}"/>
+            </a:ext>
+          </a:extLst>
+        </p:cNvPr>
+        <p:cNvGrpSpPr/>
+        <p:nvPr/>
+      </p:nvGrpSpPr>
+      <p:grpSpPr>
+        <a:xfrm>
+          <a:off x="0" y="0"/>
+          <a:ext cx="0" cy="0"/>
+          <a:chOff x="0" y="0"/>
+          <a:chExt cx="0" cy="0"/>
+        </a:xfrm>
+      </p:grpSpPr>
+      <p:sp>
+        <p:nvSpPr>
+          <p:cNvPr id="2" name="Title 1">
+            <a:extLst>
+              <a:ext uri="{FF2B5EF4-FFF2-40B4-BE49-F238E27FC236}">
+                <a16:creationId xmlns:a16="http://schemas.microsoft.com/office/drawing/2014/main" id="{2404D172-88D6-EA99-6BC0-1AF6BAEBBAE1}"/>
+              </a:ext>
+            </a:extLst>
+          </p:cNvPr>
+          <p:cNvSpPr>
+            <a:spLocks noGrp="1"/>
+          </p:cNvSpPr>
+          <p:nvPr>
+            <p:ph type="ctrTitle"/>
+          </p:nvPr>
+        </p:nvSpPr>
+        <p:spPr>
+          <a:xfrm>
+            <a:off x="755374" y="229111"/>
+            <a:ext cx="10567135" cy="750709"/>
+          </a:xfrm>
+        </p:spPr>
+        <p:txBody>
+          <a:bodyPr>
+            <a:normAutofit/>
+          </a:bodyPr>
+          <a:lstStyle/>
+          <a:p>
+            <a:r>
+              <a:rPr lang="en-US" sz="4000" dirty="0">
+                <a:latin typeface="Segoe UI" panose="020B0502040204020203" pitchFamily="34" charset="0"/>
+                <a:cs typeface="Segoe UI" panose="020B0502040204020203" pitchFamily="34" charset="0"/>
+              </a:rPr>
+              <a:t>Initial prototype/POC Architecture Diagram</a:t>
+            </a:r>
+          </a:p>
+        </p:txBody>
+      </p:sp>
+      <p:sp>
+        <p:nvSpPr>
+          <p:cNvPr id="4" name="Rectangle 3">
+            <a:extLst>
+              <a:ext uri="{FF2B5EF4-FFF2-40B4-BE49-F238E27FC236}">
+                <a16:creationId xmlns:a16="http://schemas.microsoft.com/office/drawing/2014/main" id="{FDE498AB-3C48-1FD2-D159-F5557685BFB4}"/>
+              </a:ext>
+            </a:extLst>
+          </p:cNvPr>
+          <p:cNvSpPr/>
+          <p:nvPr/>
+        </p:nvSpPr>
+        <p:spPr>
+          <a:xfrm>
+            <a:off x="755374" y="1311965"/>
+            <a:ext cx="10567135" cy="4755459"/>
+          </a:xfrm>
+          <a:prstGeom prst="rect">
+            <a:avLst/>
+          </a:prstGeom>
+          <a:solidFill>
+            <a:srgbClr val="F2F2F2"/>
+          </a:solidFill>
+          <a:ln>
+            <a:noFill/>
+          </a:ln>
+        </p:spPr>
+        <p:style>
+          <a:lnRef idx="2">
+            <a:schemeClr val="accent1">
+              <a:shade val="15000"/>
+            </a:schemeClr>
+          </a:lnRef>
+          <a:fillRef idx="1">
+            <a:schemeClr val="accent1"/>
+          </a:fillRef>
+          <a:effectRef idx="0">
+            <a:schemeClr val="accent1"/>
+          </a:effectRef>
+          <a:fontRef idx="minor">
+            <a:schemeClr val="lt1"/>
+          </a:fontRef>
+        </p:style>
+        <p:txBody>
+          <a:bodyPr rtlCol="0" anchor="ctr"/>
+          <a:lstStyle/>
+          <a:p>
+            <a:pPr marL="0" marR="0" lvl="0" indent="0" algn="ctr" defTabSz="914400" rtl="0" eaLnBrk="1" fontAlgn="auto" latinLnBrk="0" hangingPunct="1">
+              <a:lnSpc>
+                <a:spcPct val="100000"/>
+              </a:lnSpc>
+              <a:spcBef>
+                <a:spcPts val="0"/>
+              </a:spcBef>
+              <a:spcAft>
+                <a:spcPts val="0"/>
+              </a:spcAft>
+              <a:buClrTx/>
+              <a:buSzTx/>
+              <a:buFontTx/>
+              <a:buNone/>
+              <a:tabLst/>
+              <a:defRPr/>
+            </a:pPr>
+            <a:endParaRPr kumimoji="0" lang="en-US" sz="1800" b="0" i="0" u="none" strike="noStrike" kern="1200" cap="none" spc="0" normalizeH="0" baseline="0" noProof="0">
+              <a:ln>
+                <a:noFill/>
+              </a:ln>
+              <a:solidFill>
+                <a:prstClr val="white"/>
+              </a:solidFill>
+              <a:effectLst/>
+              <a:uLnTx/>
+              <a:uFillTx/>
+              <a:latin typeface="Aptos" panose="02110004020202020204"/>
+              <a:ea typeface="+mn-ea"/>
+              <a:cs typeface="+mn-cs"/>
+            </a:endParaRPr>
+          </a:p>
+        </p:txBody>
+      </p:sp>
+      <p:sp>
+        <p:nvSpPr>
+          <p:cNvPr id="5" name="Rectangle: Rounded Corners 4">
+            <a:extLst>
+              <a:ext uri="{FF2B5EF4-FFF2-40B4-BE49-F238E27FC236}">
+                <a16:creationId xmlns:a16="http://schemas.microsoft.com/office/drawing/2014/main" id="{A33A8F7F-52AB-8916-F9E3-17EA7B2151DC}"/>
+              </a:ext>
+            </a:extLst>
+          </p:cNvPr>
+          <p:cNvSpPr/>
+          <p:nvPr/>
+        </p:nvSpPr>
+        <p:spPr>
+          <a:xfrm>
+            <a:off x="5481976" y="2110236"/>
+            <a:ext cx="2047461" cy="1103244"/>
+          </a:xfrm>
+          <a:prstGeom prst="roundRect">
+            <a:avLst/>
+          </a:prstGeom>
+          <a:solidFill>
+            <a:schemeClr val="bg1"/>
+          </a:solidFill>
+          <a:ln>
+            <a:solidFill>
+              <a:schemeClr val="tx1"/>
+            </a:solidFill>
+          </a:ln>
+        </p:spPr>
+        <p:style>
+          <a:lnRef idx="2">
+            <a:schemeClr val="accent1">
+              <a:shade val="15000"/>
+            </a:schemeClr>
+          </a:lnRef>
+          <a:fillRef idx="1">
+            <a:schemeClr val="accent1"/>
+          </a:fillRef>
+          <a:effectRef idx="0">
+            <a:schemeClr val="accent1"/>
+          </a:effectRef>
+          <a:fontRef idx="minor">
+            <a:schemeClr val="lt1"/>
+          </a:fontRef>
+        </p:style>
+        <p:txBody>
+          <a:bodyPr rtlCol="0" anchor="ctr"/>
+          <a:lstStyle/>
+          <a:p>
+            <a:pPr marL="0" marR="0" lvl="0" indent="0" algn="ctr" defTabSz="914400" rtl="0" eaLnBrk="1" fontAlgn="auto" latinLnBrk="0" hangingPunct="1">
+              <a:lnSpc>
+                <a:spcPct val="100000"/>
+              </a:lnSpc>
+              <a:spcBef>
+                <a:spcPts val="0"/>
+              </a:spcBef>
+              <a:spcAft>
+                <a:spcPts val="0"/>
+              </a:spcAft>
+              <a:buClrTx/>
+              <a:buSzTx/>
+              <a:buFontTx/>
+              <a:buNone/>
+              <a:tabLst/>
+              <a:defRPr/>
+            </a:pPr>
+            <a:endParaRPr kumimoji="0" lang="en-US" sz="1800" b="0" i="0" u="none" strike="noStrike" kern="1200" cap="none" spc="0" normalizeH="0" baseline="0" noProof="0" dirty="0">
+              <a:ln>
+                <a:noFill/>
+              </a:ln>
+              <a:solidFill>
+                <a:prstClr val="white"/>
+              </a:solidFill>
+              <a:effectLst/>
+              <a:uLnTx/>
+              <a:uFillTx/>
+              <a:latin typeface="Aptos" panose="02110004020202020204"/>
+              <a:ea typeface="+mn-ea"/>
+              <a:cs typeface="+mn-cs"/>
+            </a:endParaRPr>
+          </a:p>
+        </p:txBody>
+      </p:sp>
+      <p:sp>
+        <p:nvSpPr>
+          <p:cNvPr id="7" name="TextBox 6">
+            <a:extLst>
+              <a:ext uri="{FF2B5EF4-FFF2-40B4-BE49-F238E27FC236}">
+                <a16:creationId xmlns:a16="http://schemas.microsoft.com/office/drawing/2014/main" id="{B775193A-83E5-F332-983F-A9E4585B93A6}"/>
+              </a:ext>
+            </a:extLst>
+          </p:cNvPr>
+          <p:cNvSpPr txBox="1"/>
+          <p:nvPr/>
+        </p:nvSpPr>
+        <p:spPr>
+          <a:xfrm>
+            <a:off x="6141591" y="2097208"/>
+            <a:ext cx="1189346" cy="523220"/>
+          </a:xfrm>
+          <a:prstGeom prst="rect">
+            <a:avLst/>
+          </a:prstGeom>
+          <a:noFill/>
+        </p:spPr>
+        <p:txBody>
+          <a:bodyPr wrap="square">
+            <a:spAutoFit/>
+          </a:bodyPr>
+          <a:lstStyle/>
+          <a:p>
+            <a:pPr marL="0" marR="0" lvl="0" indent="0" algn="ctr" defTabSz="914400" rtl="0" eaLnBrk="1" fontAlgn="auto" latinLnBrk="0" hangingPunct="1">
+              <a:lnSpc>
+                <a:spcPct val="100000"/>
+              </a:lnSpc>
+              <a:spcBef>
+                <a:spcPts val="0"/>
+              </a:spcBef>
+              <a:spcAft>
+                <a:spcPts val="0"/>
+              </a:spcAft>
+              <a:buClrTx/>
+              <a:buSzTx/>
+              <a:buFontTx/>
+              <a:buNone/>
+              <a:tabLst/>
+              <a:defRPr/>
+            </a:pPr>
+            <a:r>
+              <a:rPr kumimoji="0" lang="en-US" sz="1400" b="0" i="0" u="none" strike="noStrike" kern="1200" cap="none" spc="0" normalizeH="0" baseline="0" noProof="0" dirty="0">
+                <a:ln>
+                  <a:noFill/>
+                </a:ln>
+                <a:solidFill>
+                  <a:prstClr val="black"/>
+                </a:solidFill>
+                <a:effectLst/>
+                <a:uLnTx/>
+                <a:uFillTx/>
+                <a:latin typeface="Segoe UI" panose="020B0502040204020203" pitchFamily="34" charset="0"/>
+                <a:ea typeface="+mn-ea"/>
+                <a:cs typeface="Segoe UI" panose="020B0502040204020203" pitchFamily="34" charset="0"/>
+              </a:rPr>
+              <a:t>AI Agent</a:t>
+            </a:r>
+          </a:p>
+          <a:p>
+            <a:pPr marL="0" marR="0" lvl="0" indent="0" algn="ctr" defTabSz="914400" rtl="0" eaLnBrk="1" fontAlgn="auto" latinLnBrk="0" hangingPunct="1">
+              <a:lnSpc>
+                <a:spcPct val="100000"/>
+              </a:lnSpc>
+              <a:spcBef>
+                <a:spcPts val="0"/>
+              </a:spcBef>
+              <a:spcAft>
+                <a:spcPts val="0"/>
+              </a:spcAft>
+              <a:buClrTx/>
+              <a:buSzTx/>
+              <a:buFontTx/>
+              <a:buNone/>
+              <a:tabLst/>
+              <a:defRPr/>
+            </a:pPr>
+            <a:r>
+              <a:rPr kumimoji="0" lang="en-US" sz="1400" b="0" i="0" u="none" strike="noStrike" kern="1200" cap="none" spc="0" normalizeH="0" baseline="0" noProof="0" dirty="0">
+                <a:ln>
+                  <a:noFill/>
+                </a:ln>
+                <a:solidFill>
+                  <a:prstClr val="white">
+                    <a:lumMod val="50000"/>
+                  </a:prstClr>
+                </a:solidFill>
+                <a:effectLst/>
+                <a:uLnTx/>
+                <a:uFillTx/>
+                <a:latin typeface="Segoe UI" panose="020B0502040204020203" pitchFamily="34" charset="0"/>
+                <a:ea typeface="+mn-ea"/>
+                <a:cs typeface="Segoe UI" panose="020B0502040204020203" pitchFamily="34" charset="0"/>
+              </a:rPr>
+              <a:t>Orchestrator</a:t>
+            </a:r>
+          </a:p>
+        </p:txBody>
+      </p:sp>
+      <p:pic>
+        <p:nvPicPr>
+          <p:cNvPr id="36" name="Picture 35">
+            <a:extLst>
+              <a:ext uri="{FF2B5EF4-FFF2-40B4-BE49-F238E27FC236}">
+                <a16:creationId xmlns:a16="http://schemas.microsoft.com/office/drawing/2014/main" id="{B7120497-70CE-6479-7D74-BBA57805A277}"/>
+              </a:ext>
+            </a:extLst>
+          </p:cNvPr>
+          <p:cNvPicPr>
+            <a:picLocks noChangeAspect="1"/>
+          </p:cNvPicPr>
+          <p:nvPr/>
+        </p:nvPicPr>
+        <p:blipFill>
+          <a:blip r:embed="rId3"/>
+          <a:stretch>
+            <a:fillRect/>
+          </a:stretch>
+        </p:blipFill>
+        <p:spPr>
+          <a:xfrm>
+            <a:off x="5596332" y="2143406"/>
+            <a:ext cx="500312" cy="443353"/>
+          </a:xfrm>
+          <a:prstGeom prst="rect">
+            <a:avLst/>
+          </a:prstGeom>
+        </p:spPr>
+      </p:pic>
+      <p:sp>
+        <p:nvSpPr>
+          <p:cNvPr id="40" name="Rectangle: Rounded Corners 39">
+            <a:extLst>
+              <a:ext uri="{FF2B5EF4-FFF2-40B4-BE49-F238E27FC236}">
+                <a16:creationId xmlns:a16="http://schemas.microsoft.com/office/drawing/2014/main" id="{E2296413-E9C9-9EEA-E0E3-2F5FB177661C}"/>
+              </a:ext>
+            </a:extLst>
+          </p:cNvPr>
+          <p:cNvSpPr/>
+          <p:nvPr/>
+        </p:nvSpPr>
+        <p:spPr>
+          <a:xfrm>
+            <a:off x="2739225" y="2110237"/>
+            <a:ext cx="2047461" cy="1103244"/>
+          </a:xfrm>
+          <a:prstGeom prst="roundRect">
+            <a:avLst/>
+          </a:prstGeom>
+          <a:solidFill>
+            <a:schemeClr val="bg1"/>
+          </a:solidFill>
+          <a:ln>
+            <a:solidFill>
+              <a:srgbClr val="2189B8"/>
+            </a:solidFill>
+          </a:ln>
+        </p:spPr>
+        <p:style>
+          <a:lnRef idx="2">
+            <a:schemeClr val="accent1">
+              <a:shade val="15000"/>
+            </a:schemeClr>
+          </a:lnRef>
+          <a:fillRef idx="1">
+            <a:schemeClr val="accent1"/>
+          </a:fillRef>
+          <a:effectRef idx="0">
+            <a:schemeClr val="accent1"/>
+          </a:effectRef>
+          <a:fontRef idx="minor">
+            <a:schemeClr val="lt1"/>
+          </a:fontRef>
+        </p:style>
+        <p:txBody>
+          <a:bodyPr rtlCol="0" anchor="ctr"/>
+          <a:lstStyle/>
+          <a:p>
+            <a:pPr marL="0" marR="0" lvl="0" indent="0" algn="ctr" defTabSz="914400" rtl="0" eaLnBrk="1" fontAlgn="auto" latinLnBrk="0" hangingPunct="1">
+              <a:lnSpc>
+                <a:spcPct val="100000"/>
+              </a:lnSpc>
+              <a:spcBef>
+                <a:spcPts val="0"/>
+              </a:spcBef>
+              <a:spcAft>
+                <a:spcPts val="0"/>
+              </a:spcAft>
+              <a:buClrTx/>
+              <a:buSzTx/>
+              <a:buFontTx/>
+              <a:buNone/>
+              <a:tabLst/>
+              <a:defRPr/>
+            </a:pPr>
+            <a:endParaRPr kumimoji="0" lang="en-US" sz="1800" b="0" i="0" u="none" strike="noStrike" kern="1200" cap="none" spc="0" normalizeH="0" baseline="0" noProof="0" dirty="0">
+              <a:ln>
+                <a:noFill/>
+              </a:ln>
+              <a:solidFill>
+                <a:prstClr val="white"/>
+              </a:solidFill>
+              <a:effectLst/>
+              <a:uLnTx/>
+              <a:uFillTx/>
+              <a:latin typeface="Aptos" panose="02110004020202020204"/>
+              <a:ea typeface="+mn-ea"/>
+              <a:cs typeface="+mn-cs"/>
+            </a:endParaRPr>
+          </a:p>
+        </p:txBody>
+      </p:sp>
+      <p:sp>
+        <p:nvSpPr>
+          <p:cNvPr id="41" name="TextBox 40">
+            <a:extLst>
+              <a:ext uri="{FF2B5EF4-FFF2-40B4-BE49-F238E27FC236}">
+                <a16:creationId xmlns:a16="http://schemas.microsoft.com/office/drawing/2014/main" id="{670F1925-53AE-32FB-1C12-5C2F58BB4A60}"/>
+              </a:ext>
+            </a:extLst>
+          </p:cNvPr>
+          <p:cNvSpPr txBox="1"/>
+          <p:nvPr/>
+        </p:nvSpPr>
+        <p:spPr>
+          <a:xfrm>
+            <a:off x="3509565" y="2120881"/>
+            <a:ext cx="1189346" cy="646331"/>
+          </a:xfrm>
+          <a:prstGeom prst="rect">
+            <a:avLst/>
+          </a:prstGeom>
+          <a:noFill/>
+        </p:spPr>
+        <p:txBody>
+          <a:bodyPr wrap="square">
+            <a:spAutoFit/>
+          </a:bodyPr>
+          <a:lstStyle/>
+          <a:p>
+            <a:pPr marL="0" marR="0" lvl="0" indent="0" algn="ctr" defTabSz="914400" rtl="0" eaLnBrk="1" fontAlgn="auto" latinLnBrk="0" hangingPunct="1">
+              <a:lnSpc>
+                <a:spcPct val="100000"/>
+              </a:lnSpc>
+              <a:spcBef>
+                <a:spcPts val="0"/>
+              </a:spcBef>
+              <a:spcAft>
+                <a:spcPts val="0"/>
+              </a:spcAft>
+              <a:buClrTx/>
+              <a:buSzTx/>
+              <a:buFontTx/>
+              <a:buNone/>
+              <a:tabLst/>
+              <a:defRPr/>
+            </a:pPr>
+            <a:r>
+              <a:rPr kumimoji="0" lang="en-US" sz="1400" b="0" i="0" u="none" strike="noStrike" kern="1200" cap="none" spc="0" normalizeH="0" baseline="0" noProof="0" dirty="0">
+                <a:ln>
+                  <a:noFill/>
+                </a:ln>
+                <a:solidFill>
+                  <a:prstClr val="black"/>
+                </a:solidFill>
+                <a:effectLst/>
+                <a:uLnTx/>
+                <a:uFillTx/>
+                <a:latin typeface="Segoe UI" panose="020B0502040204020203" pitchFamily="34" charset="0"/>
+                <a:ea typeface="+mn-ea"/>
+                <a:cs typeface="Segoe UI" panose="020B0502040204020203" pitchFamily="34" charset="0"/>
+              </a:rPr>
+              <a:t>Chat UI</a:t>
+            </a:r>
+          </a:p>
+          <a:p>
+            <a:pPr marL="0" marR="0" lvl="0" indent="0" algn="ctr" defTabSz="914400" rtl="0" eaLnBrk="1" fontAlgn="auto" latinLnBrk="0" hangingPunct="1">
+              <a:lnSpc>
+                <a:spcPct val="100000"/>
+              </a:lnSpc>
+              <a:spcBef>
+                <a:spcPts val="0"/>
+              </a:spcBef>
+              <a:spcAft>
+                <a:spcPts val="0"/>
+              </a:spcAft>
+              <a:buClrTx/>
+              <a:buSzTx/>
+              <a:buFontTx/>
+              <a:buNone/>
+              <a:tabLst/>
+              <a:defRPr/>
+            </a:pPr>
+            <a:r>
+              <a:rPr kumimoji="0" lang="en-US" sz="1100" b="0" i="0" u="none" strike="noStrike" kern="1200" cap="none" spc="0" normalizeH="0" baseline="0" noProof="0" dirty="0">
+                <a:ln>
+                  <a:noFill/>
+                </a:ln>
+                <a:solidFill>
+                  <a:prstClr val="white">
+                    <a:lumMod val="50000"/>
+                  </a:prstClr>
+                </a:solidFill>
+                <a:effectLst/>
+                <a:uLnTx/>
+                <a:uFillTx/>
+                <a:latin typeface="Segoe UI" panose="020B0502040204020203" pitchFamily="34" charset="0"/>
+                <a:ea typeface="+mn-ea"/>
+                <a:cs typeface="Segoe UI" panose="020B0502040204020203" pitchFamily="34" charset="0"/>
+              </a:rPr>
+              <a:t>Claude, GitHub CoPilot, etc.</a:t>
+            </a:r>
+          </a:p>
+        </p:txBody>
+      </p:sp>
+      <p:pic>
+        <p:nvPicPr>
+          <p:cNvPr id="23556" name="Picture 4" descr="User Icon Images – Browse 1,701,604 Stock Photos, Vectors ...">
+            <a:extLst>
+              <a:ext uri="{FF2B5EF4-FFF2-40B4-BE49-F238E27FC236}">
+                <a16:creationId xmlns:a16="http://schemas.microsoft.com/office/drawing/2014/main" id="{93A7AF3C-EE48-3E0B-5E96-8FEA4EC66E90}"/>
+              </a:ext>
+            </a:extLst>
+          </p:cNvPr>
+          <p:cNvPicPr>
+            <a:picLocks noChangeAspect="1" noChangeArrowheads="1"/>
+          </p:cNvPicPr>
+          <p:nvPr/>
+        </p:nvPicPr>
+        <p:blipFill rotWithShape="1">
+          <a:blip r:embed="rId4">
+            <a:clrChange>
+              <a:clrFrom>
+                <a:srgbClr val="FFFFFF"/>
+              </a:clrFrom>
+              <a:clrTo>
+                <a:srgbClr val="FFFFFF">
+                  <a:alpha val="0"/>
+                </a:srgbClr>
+              </a:clrTo>
+            </a:clrChange>
+            <a:duotone>
+              <a:schemeClr val="accent4">
+                <a:shade val="45000"/>
+                <a:satMod val="135000"/>
+              </a:schemeClr>
+              <a:prstClr val="white"/>
+            </a:duotone>
+            <a:extLst>
+              <a:ext uri="{28A0092B-C50C-407E-A947-70E740481C1C}">
+                <a14:useLocalDpi xmlns:a14="http://schemas.microsoft.com/office/drawing/2010/main" val="0"/>
+              </a:ext>
+            </a:extLst>
+          </a:blip>
+          <a:srcRect l="19935" t="20528" r="20355" b="20435"/>
+          <a:stretch>
+            <a:fillRect/>
+          </a:stretch>
+        </p:blipFill>
+        <p:spPr bwMode="auto">
+          <a:xfrm>
+            <a:off x="1211949" y="2303152"/>
+            <a:ext cx="732147" cy="723895"/>
+          </a:xfrm>
+          <a:prstGeom prst="rect">
+            <a:avLst/>
+          </a:prstGeom>
+          <a:noFill/>
+          <a:extLst>
+            <a:ext uri="{909E8E84-426E-40DD-AFC4-6F175D3DCCD1}">
+              <a14:hiddenFill xmlns:a14="http://schemas.microsoft.com/office/drawing/2010/main">
+                <a:solidFill>
+                  <a:srgbClr val="FFFFFF"/>
+                </a:solidFill>
+              </a14:hiddenFill>
+            </a:ext>
+          </a:extLst>
+        </p:spPr>
+      </p:pic>
+      <p:sp>
+        <p:nvSpPr>
+          <p:cNvPr id="42" name="TextBox 41">
+            <a:extLst>
+              <a:ext uri="{FF2B5EF4-FFF2-40B4-BE49-F238E27FC236}">
+                <a16:creationId xmlns:a16="http://schemas.microsoft.com/office/drawing/2014/main" id="{62CE79E6-4AE6-C25E-C303-9AB0F795D216}"/>
+              </a:ext>
+            </a:extLst>
+          </p:cNvPr>
+          <p:cNvSpPr txBox="1"/>
+          <p:nvPr/>
+        </p:nvSpPr>
+        <p:spPr>
+          <a:xfrm>
+            <a:off x="1152315" y="2970966"/>
+            <a:ext cx="891620" cy="307777"/>
+          </a:xfrm>
+          <a:prstGeom prst="rect">
+            <a:avLst/>
+          </a:prstGeom>
+          <a:noFill/>
+        </p:spPr>
+        <p:txBody>
+          <a:bodyPr wrap="square">
+            <a:spAutoFit/>
+          </a:bodyPr>
+          <a:lstStyle/>
+          <a:p>
+            <a:pPr marL="0" marR="0" lvl="0" indent="0" algn="ctr" defTabSz="914400" rtl="0" eaLnBrk="1" fontAlgn="auto" latinLnBrk="0" hangingPunct="1">
+              <a:lnSpc>
+                <a:spcPct val="100000"/>
+              </a:lnSpc>
+              <a:spcBef>
+                <a:spcPts val="0"/>
+              </a:spcBef>
+              <a:spcAft>
+                <a:spcPts val="0"/>
+              </a:spcAft>
+              <a:buClrTx/>
+              <a:buSzTx/>
+              <a:buFontTx/>
+              <a:buNone/>
+              <a:tabLst/>
+              <a:defRPr/>
+            </a:pPr>
+            <a:r>
+              <a:rPr kumimoji="0" lang="en-US" sz="1400" b="0" i="0" u="none" strike="noStrike" kern="1200" cap="none" spc="0" normalizeH="0" baseline="0" noProof="0" dirty="0">
+                <a:ln>
+                  <a:noFill/>
+                </a:ln>
+                <a:solidFill>
+                  <a:prstClr val="black"/>
+                </a:solidFill>
+                <a:effectLst/>
+                <a:uLnTx/>
+                <a:uFillTx/>
+                <a:latin typeface="Segoe UI" panose="020B0502040204020203" pitchFamily="34" charset="0"/>
+                <a:ea typeface="+mn-ea"/>
+                <a:cs typeface="Segoe UI" panose="020B0502040204020203" pitchFamily="34" charset="0"/>
+              </a:rPr>
+              <a:t>User</a:t>
+            </a:r>
+          </a:p>
+        </p:txBody>
+      </p:sp>
+      <p:cxnSp>
+        <p:nvCxnSpPr>
+          <p:cNvPr id="44" name="Straight Arrow Connector 43">
+            <a:extLst>
+              <a:ext uri="{FF2B5EF4-FFF2-40B4-BE49-F238E27FC236}">
+                <a16:creationId xmlns:a16="http://schemas.microsoft.com/office/drawing/2014/main" id="{B5CFD885-AEF2-EF7A-A583-10F2D5257545}"/>
+              </a:ext>
+            </a:extLst>
+          </p:cNvPr>
+          <p:cNvCxnSpPr>
+            <a:stCxn id="23556" idx="3"/>
+            <a:endCxn id="40" idx="1"/>
+          </p:cNvCxnSpPr>
+          <p:nvPr/>
+        </p:nvCxnSpPr>
+        <p:spPr>
+          <a:xfrm flipV="1">
+            <a:off x="1944096" y="2661859"/>
+            <a:ext cx="795129" cy="3241"/>
+          </a:xfrm>
+          <a:prstGeom prst="straightConnector1">
+            <a:avLst/>
+          </a:prstGeom>
+          <a:ln>
+            <a:headEnd type="triangle"/>
+            <a:tailEnd type="triangle"/>
+          </a:ln>
+        </p:spPr>
+        <p:style>
+          <a:lnRef idx="2">
+            <a:schemeClr val="dk1"/>
+          </a:lnRef>
+          <a:fillRef idx="0">
+            <a:schemeClr val="dk1"/>
+          </a:fillRef>
+          <a:effectRef idx="1">
+            <a:schemeClr val="dk1"/>
+          </a:effectRef>
+          <a:fontRef idx="minor">
+            <a:schemeClr val="tx1"/>
+          </a:fontRef>
+        </p:style>
+      </p:cxnSp>
+      <p:cxnSp>
+        <p:nvCxnSpPr>
+          <p:cNvPr id="45" name="Straight Arrow Connector 44">
+            <a:extLst>
+              <a:ext uri="{FF2B5EF4-FFF2-40B4-BE49-F238E27FC236}">
+                <a16:creationId xmlns:a16="http://schemas.microsoft.com/office/drawing/2014/main" id="{60273D2B-6369-6FCF-E691-094ACD1802D9}"/>
+              </a:ext>
+            </a:extLst>
+          </p:cNvPr>
+          <p:cNvCxnSpPr>
+            <a:cxnSpLocks/>
+          </p:cNvCxnSpPr>
+          <p:nvPr/>
+        </p:nvCxnSpPr>
+        <p:spPr>
+          <a:xfrm flipV="1">
+            <a:off x="4681437" y="2673418"/>
+            <a:ext cx="800539" cy="261889"/>
+          </a:xfrm>
+          <a:prstGeom prst="straightConnector1">
+            <a:avLst/>
+          </a:prstGeom>
+          <a:ln>
+            <a:headEnd type="triangle"/>
+            <a:tailEnd type="triangle"/>
+          </a:ln>
+        </p:spPr>
+        <p:style>
+          <a:lnRef idx="2">
+            <a:schemeClr val="dk1"/>
+          </a:lnRef>
+          <a:fillRef idx="0">
+            <a:schemeClr val="dk1"/>
+          </a:fillRef>
+          <a:effectRef idx="1">
+            <a:schemeClr val="dk1"/>
+          </a:effectRef>
+          <a:fontRef idx="minor">
+            <a:schemeClr val="tx1"/>
+          </a:fontRef>
+        </p:style>
+      </p:cxnSp>
+      <p:pic>
+        <p:nvPicPr>
+          <p:cNvPr id="47" name="Picture 46">
+            <a:extLst>
+              <a:ext uri="{FF2B5EF4-FFF2-40B4-BE49-F238E27FC236}">
+                <a16:creationId xmlns:a16="http://schemas.microsoft.com/office/drawing/2014/main" id="{DEC483FB-C404-8CBC-6796-8E56F6FE0049}"/>
+              </a:ext>
+            </a:extLst>
+          </p:cNvPr>
+          <p:cNvPicPr>
+            <a:picLocks noChangeAspect="1"/>
+          </p:cNvPicPr>
+          <p:nvPr/>
+        </p:nvPicPr>
+        <p:blipFill>
+          <a:blip r:embed="rId5"/>
+          <a:stretch>
+            <a:fillRect/>
+          </a:stretch>
+        </p:blipFill>
+        <p:spPr>
+          <a:xfrm>
+            <a:off x="2838278" y="2454086"/>
+            <a:ext cx="713056" cy="415545"/>
+          </a:xfrm>
+          <a:prstGeom prst="rect">
+            <a:avLst/>
+          </a:prstGeom>
+          <a:ln>
+            <a:solidFill>
+              <a:schemeClr val="bg1">
+                <a:lumMod val="75000"/>
+              </a:schemeClr>
+            </a:solidFill>
+          </a:ln>
+        </p:spPr>
+      </p:pic>
+      <p:sp>
+        <p:nvSpPr>
+          <p:cNvPr id="48" name="TextBox 47">
+            <a:extLst>
+              <a:ext uri="{FF2B5EF4-FFF2-40B4-BE49-F238E27FC236}">
+                <a16:creationId xmlns:a16="http://schemas.microsoft.com/office/drawing/2014/main" id="{FF583515-6C96-6674-A508-B0ED64246822}"/>
+              </a:ext>
+            </a:extLst>
+          </p:cNvPr>
+          <p:cNvSpPr txBox="1"/>
+          <p:nvPr/>
+        </p:nvSpPr>
+        <p:spPr>
+          <a:xfrm>
+            <a:off x="3655022" y="2767212"/>
+            <a:ext cx="1026415" cy="307777"/>
+          </a:xfrm>
+          <a:prstGeom prst="rect">
+            <a:avLst/>
+          </a:prstGeom>
+          <a:noFill/>
+          <a:ln>
+            <a:solidFill>
+              <a:schemeClr val="bg1">
+                <a:lumMod val="85000"/>
+              </a:schemeClr>
+            </a:solidFill>
+          </a:ln>
+        </p:spPr>
+        <p:txBody>
+          <a:bodyPr wrap="square">
+            <a:spAutoFit/>
+          </a:bodyPr>
+          <a:lstStyle/>
+          <a:p>
+            <a:pPr marL="0" marR="0" lvl="0" indent="0" algn="ctr" defTabSz="914400" rtl="0" eaLnBrk="1" fontAlgn="auto" latinLnBrk="0" hangingPunct="1">
+              <a:lnSpc>
+                <a:spcPct val="100000"/>
+              </a:lnSpc>
+              <a:spcBef>
+                <a:spcPts val="0"/>
+              </a:spcBef>
+              <a:spcAft>
+                <a:spcPts val="0"/>
+              </a:spcAft>
+              <a:buClrTx/>
+              <a:buSzTx/>
+              <a:buFontTx/>
+              <a:buNone/>
+              <a:tabLst/>
+              <a:defRPr/>
+            </a:pPr>
+            <a:r>
+              <a:rPr kumimoji="0" lang="en-US" sz="1400" b="0" i="0" u="none" strike="noStrike" kern="1200" cap="none" spc="0" normalizeH="0" baseline="0" noProof="0" dirty="0">
+                <a:ln>
+                  <a:noFill/>
+                </a:ln>
+                <a:solidFill>
+                  <a:prstClr val="black"/>
+                </a:solidFill>
+                <a:effectLst/>
+                <a:uLnTx/>
+                <a:uFillTx/>
+                <a:latin typeface="Segoe UI" panose="020B0502040204020203" pitchFamily="34" charset="0"/>
+                <a:ea typeface="+mn-ea"/>
+                <a:cs typeface="Segoe UI" panose="020B0502040204020203" pitchFamily="34" charset="0"/>
+              </a:rPr>
+              <a:t>MCP client</a:t>
+            </a:r>
+            <a:endParaRPr kumimoji="0" lang="en-US" sz="1100" b="0" i="0" u="none" strike="noStrike" kern="1200" cap="none" spc="0" normalizeH="0" baseline="0" noProof="0" dirty="0">
+              <a:ln>
+                <a:noFill/>
+              </a:ln>
+              <a:solidFill>
+                <a:prstClr val="white">
+                  <a:lumMod val="50000"/>
+                </a:prstClr>
+              </a:solidFill>
+              <a:effectLst/>
+              <a:uLnTx/>
+              <a:uFillTx/>
+              <a:latin typeface="Segoe UI" panose="020B0502040204020203" pitchFamily="34" charset="0"/>
+              <a:ea typeface="+mn-ea"/>
+              <a:cs typeface="Segoe UI" panose="020B0502040204020203" pitchFamily="34" charset="0"/>
+            </a:endParaRPr>
+          </a:p>
+        </p:txBody>
+      </p:sp>
+      <p:sp>
+        <p:nvSpPr>
+          <p:cNvPr id="52" name="TextBox 51">
+            <a:extLst>
+              <a:ext uri="{FF2B5EF4-FFF2-40B4-BE49-F238E27FC236}">
+                <a16:creationId xmlns:a16="http://schemas.microsoft.com/office/drawing/2014/main" id="{5B13A669-9069-F5B2-15F5-432BD65A7EE2}"/>
+              </a:ext>
+            </a:extLst>
+          </p:cNvPr>
+          <p:cNvSpPr txBox="1"/>
+          <p:nvPr/>
+        </p:nvSpPr>
+        <p:spPr>
+          <a:xfrm>
+            <a:off x="4698911" y="2358818"/>
+            <a:ext cx="795129" cy="430887"/>
+          </a:xfrm>
+          <a:prstGeom prst="rect">
+            <a:avLst/>
+          </a:prstGeom>
+          <a:noFill/>
+        </p:spPr>
+        <p:txBody>
+          <a:bodyPr wrap="square">
+            <a:spAutoFit/>
+          </a:bodyPr>
+          <a:lstStyle/>
+          <a:p>
+            <a:pPr marL="0" marR="0" lvl="0" indent="0" algn="ctr" defTabSz="914400" rtl="0" eaLnBrk="1" fontAlgn="auto" latinLnBrk="0" hangingPunct="1">
+              <a:lnSpc>
+                <a:spcPct val="100000"/>
+              </a:lnSpc>
+              <a:spcBef>
+                <a:spcPts val="0"/>
+              </a:spcBef>
+              <a:spcAft>
+                <a:spcPts val="0"/>
+              </a:spcAft>
+              <a:buClrTx/>
+              <a:buSzTx/>
+              <a:buFontTx/>
+              <a:buNone/>
+              <a:tabLst/>
+              <a:defRPr/>
+            </a:pPr>
+            <a:r>
+              <a:rPr kumimoji="0" lang="en-US" sz="1050" b="0" i="0" u="none" strike="noStrike" kern="1200" cap="none" spc="0" normalizeH="0" baseline="0" noProof="0" dirty="0">
+                <a:ln>
+                  <a:noFill/>
+                </a:ln>
+                <a:solidFill>
+                  <a:prstClr val="black"/>
+                </a:solidFill>
+                <a:effectLst/>
+                <a:uLnTx/>
+                <a:uFillTx/>
+                <a:latin typeface="Segoe UI" panose="020B0502040204020203" pitchFamily="34" charset="0"/>
+                <a:ea typeface="+mn-ea"/>
+                <a:cs typeface="Segoe UI" panose="020B0502040204020203" pitchFamily="34" charset="0"/>
+              </a:rPr>
+              <a:t>MCP</a:t>
+            </a:r>
+          </a:p>
+          <a:p>
+            <a:pPr marL="0" marR="0" lvl="0" indent="0" algn="ctr" defTabSz="914400" rtl="0" eaLnBrk="1" fontAlgn="auto" latinLnBrk="0" hangingPunct="1">
+              <a:lnSpc>
+                <a:spcPct val="100000"/>
+              </a:lnSpc>
+              <a:spcBef>
+                <a:spcPts val="0"/>
+              </a:spcBef>
+              <a:spcAft>
+                <a:spcPts val="0"/>
+              </a:spcAft>
+              <a:buClrTx/>
+              <a:buSzTx/>
+              <a:buFontTx/>
+              <a:buNone/>
+              <a:tabLst/>
+              <a:defRPr/>
+            </a:pPr>
+            <a:r>
+              <a:rPr kumimoji="0" lang="en-US" sz="1050" b="0" i="0" u="none" strike="noStrike" kern="1200" cap="none" spc="0" normalizeH="0" baseline="0" noProof="0" dirty="0">
+                <a:ln>
+                  <a:noFill/>
+                </a:ln>
+                <a:solidFill>
+                  <a:prstClr val="black"/>
+                </a:solidFill>
+                <a:effectLst/>
+                <a:uLnTx/>
+                <a:uFillTx/>
+                <a:latin typeface="Segoe UI" panose="020B0502040204020203" pitchFamily="34" charset="0"/>
+                <a:ea typeface="+mn-ea"/>
+                <a:cs typeface="Segoe UI" panose="020B0502040204020203" pitchFamily="34" charset="0"/>
+              </a:rPr>
+              <a:t>(stdio)</a:t>
+            </a:r>
+          </a:p>
+        </p:txBody>
+      </p:sp>
+      <p:pic>
+        <p:nvPicPr>
+          <p:cNvPr id="23558" name="Picture 6" descr="Semantic Kernel Roadmap H1 2025 ...">
+            <a:extLst>
+              <a:ext uri="{FF2B5EF4-FFF2-40B4-BE49-F238E27FC236}">
+                <a16:creationId xmlns:a16="http://schemas.microsoft.com/office/drawing/2014/main" id="{51A36023-89A7-C879-0EF6-D310EE0F0DD9}"/>
+              </a:ext>
+            </a:extLst>
+          </p:cNvPr>
+          <p:cNvPicPr>
+            <a:picLocks noChangeAspect="1" noChangeArrowheads="1"/>
+          </p:cNvPicPr>
+          <p:nvPr/>
+        </p:nvPicPr>
+        <p:blipFill rotWithShape="1">
+          <a:blip r:embed="rId6">
+            <a:clrChange>
+              <a:clrFrom>
+                <a:srgbClr val="FFFFFF"/>
+              </a:clrFrom>
+              <a:clrTo>
+                <a:srgbClr val="FFFFFF">
+                  <a:alpha val="0"/>
+                </a:srgbClr>
+              </a:clrTo>
+            </a:clrChange>
+            <a:extLst>
+              <a:ext uri="{28A0092B-C50C-407E-A947-70E740481C1C}">
+                <a14:useLocalDpi xmlns:a14="http://schemas.microsoft.com/office/drawing/2010/main" val="0"/>
+              </a:ext>
+            </a:extLst>
+          </a:blip>
+          <a:srcRect l="28311" r="23923" b="24870"/>
+          <a:stretch>
+            <a:fillRect/>
+          </a:stretch>
+        </p:blipFill>
+        <p:spPr bwMode="auto">
+          <a:xfrm>
+            <a:off x="6414334" y="2673417"/>
+            <a:ext cx="200765" cy="258486"/>
+          </a:xfrm>
+          <a:prstGeom prst="rect">
+            <a:avLst/>
+          </a:prstGeom>
+          <a:noFill/>
+          <a:extLst>
+            <a:ext uri="{909E8E84-426E-40DD-AFC4-6F175D3DCCD1}">
+              <a14:hiddenFill xmlns:a14="http://schemas.microsoft.com/office/drawing/2010/main">
+                <a:solidFill>
+                  <a:srgbClr val="FFFFFF"/>
+                </a:solidFill>
+              </a14:hiddenFill>
+            </a:ext>
+          </a:extLst>
+        </p:spPr>
+      </p:pic>
+      <p:pic>
+        <p:nvPicPr>
+          <p:cNvPr id="23560" name="Picture 8" descr="MCP (Model Context Protocol) Logo Fr ...">
+            <a:extLst>
+              <a:ext uri="{FF2B5EF4-FFF2-40B4-BE49-F238E27FC236}">
+                <a16:creationId xmlns:a16="http://schemas.microsoft.com/office/drawing/2014/main" id="{90CC50FB-C3BE-96D9-F162-3316E455C2B9}"/>
+              </a:ext>
+            </a:extLst>
+          </p:cNvPr>
+          <p:cNvPicPr>
+            <a:picLocks noChangeAspect="1" noChangeArrowheads="1"/>
+          </p:cNvPicPr>
+          <p:nvPr/>
+        </p:nvPicPr>
+        <p:blipFill>
+          <a:blip r:embed="rId7">
+            <a:extLst>
+              <a:ext uri="{28A0092B-C50C-407E-A947-70E740481C1C}">
+                <a14:useLocalDpi xmlns:a14="http://schemas.microsoft.com/office/drawing/2010/main" val="0"/>
+              </a:ext>
+            </a:extLst>
+          </a:blip>
+          <a:srcRect/>
+          <a:stretch>
+            <a:fillRect/>
+          </a:stretch>
+        </p:blipFill>
+        <p:spPr bwMode="auto">
+          <a:xfrm>
+            <a:off x="5697796" y="2673417"/>
+            <a:ext cx="261889" cy="261889"/>
+          </a:xfrm>
+          <a:prstGeom prst="rect">
+            <a:avLst/>
+          </a:prstGeom>
+          <a:noFill/>
+          <a:extLst>
+            <a:ext uri="{909E8E84-426E-40DD-AFC4-6F175D3DCCD1}">
+              <a14:hiddenFill xmlns:a14="http://schemas.microsoft.com/office/drawing/2010/main">
+                <a:solidFill>
+                  <a:srgbClr val="FFFFFF"/>
+                </a:solidFill>
+              </a14:hiddenFill>
+            </a:ext>
+          </a:extLst>
+        </p:spPr>
+      </p:pic>
+      <p:pic>
+        <p:nvPicPr>
+          <p:cNvPr id="23562" name="Picture 10" descr="Microsoft Dot Net icon SVG Vector &amp; PNG ...">
+            <a:extLst>
+              <a:ext uri="{FF2B5EF4-FFF2-40B4-BE49-F238E27FC236}">
+                <a16:creationId xmlns:a16="http://schemas.microsoft.com/office/drawing/2014/main" id="{14CE05A4-1533-91E8-5BD7-3B7039F87254}"/>
+              </a:ext>
+            </a:extLst>
+          </p:cNvPr>
+          <p:cNvPicPr>
+            <a:picLocks noChangeAspect="1" noChangeArrowheads="1"/>
+          </p:cNvPicPr>
+          <p:nvPr/>
+        </p:nvPicPr>
+        <p:blipFill>
+          <a:blip r:embed="rId8">
+            <a:extLst>
+              <a:ext uri="{28A0092B-C50C-407E-A947-70E740481C1C}">
+                <a14:useLocalDpi xmlns:a14="http://schemas.microsoft.com/office/drawing/2010/main" val="0"/>
+              </a:ext>
+            </a:extLst>
+          </a:blip>
+          <a:srcRect/>
+          <a:stretch>
+            <a:fillRect/>
+          </a:stretch>
+        </p:blipFill>
+        <p:spPr bwMode="auto">
+          <a:xfrm>
+            <a:off x="6962461" y="2677537"/>
+            <a:ext cx="261889" cy="261889"/>
+          </a:xfrm>
+          <a:prstGeom prst="rect">
+            <a:avLst/>
+          </a:prstGeom>
+          <a:noFill/>
+          <a:extLst>
+            <a:ext uri="{909E8E84-426E-40DD-AFC4-6F175D3DCCD1}">
+              <a14:hiddenFill xmlns:a14="http://schemas.microsoft.com/office/drawing/2010/main">
+                <a:solidFill>
+                  <a:srgbClr val="FFFFFF"/>
+                </a:solidFill>
+              </a14:hiddenFill>
+            </a:ext>
+          </a:extLst>
+        </p:spPr>
+      </p:pic>
+      <p:sp>
+        <p:nvSpPr>
+          <p:cNvPr id="54" name="TextBox 53">
+            <a:extLst>
+              <a:ext uri="{FF2B5EF4-FFF2-40B4-BE49-F238E27FC236}">
+                <a16:creationId xmlns:a16="http://schemas.microsoft.com/office/drawing/2014/main" id="{3DC94B3E-F729-3A7E-76E9-D586696ABD4E}"/>
+              </a:ext>
+            </a:extLst>
+          </p:cNvPr>
+          <p:cNvSpPr txBox="1"/>
+          <p:nvPr/>
+        </p:nvSpPr>
+        <p:spPr>
+          <a:xfrm>
+            <a:off x="6203299" y="2886547"/>
+            <a:ext cx="604720" cy="338554"/>
+          </a:xfrm>
+          <a:prstGeom prst="rect">
+            <a:avLst/>
+          </a:prstGeom>
+          <a:noFill/>
+        </p:spPr>
+        <p:txBody>
+          <a:bodyPr wrap="square">
+            <a:spAutoFit/>
+          </a:bodyPr>
+          <a:lstStyle/>
+          <a:p>
+            <a:pPr marL="0" marR="0" lvl="0" indent="0" algn="ctr" defTabSz="914400" rtl="0" eaLnBrk="1" fontAlgn="auto" latinLnBrk="0" hangingPunct="1">
+              <a:lnSpc>
+                <a:spcPct val="100000"/>
+              </a:lnSpc>
+              <a:spcBef>
+                <a:spcPts val="0"/>
+              </a:spcBef>
+              <a:spcAft>
+                <a:spcPts val="0"/>
+              </a:spcAft>
+              <a:buClrTx/>
+              <a:buSzTx/>
+              <a:buFontTx/>
+              <a:buNone/>
+              <a:tabLst/>
+              <a:defRPr/>
+            </a:pPr>
+            <a:r>
+              <a:rPr kumimoji="0" lang="en-US" sz="800" b="0" i="0" u="none" strike="noStrike" kern="1200" cap="none" spc="0" normalizeH="0" baseline="0" noProof="0" dirty="0">
+                <a:ln>
+                  <a:noFill/>
+                </a:ln>
+                <a:solidFill>
+                  <a:prstClr val="black"/>
+                </a:solidFill>
+                <a:effectLst/>
+                <a:uLnTx/>
+                <a:uFillTx/>
+                <a:latin typeface="Segoe UI" panose="020B0502040204020203" pitchFamily="34" charset="0"/>
+                <a:ea typeface="+mn-ea"/>
+                <a:cs typeface="Segoe UI" panose="020B0502040204020203" pitchFamily="34" charset="0"/>
+              </a:rPr>
+              <a:t>Semantic</a:t>
+            </a:r>
+          </a:p>
+          <a:p>
+            <a:pPr marL="0" marR="0" lvl="0" indent="0" algn="ctr" defTabSz="914400" rtl="0" eaLnBrk="1" fontAlgn="auto" latinLnBrk="0" hangingPunct="1">
+              <a:lnSpc>
+                <a:spcPct val="100000"/>
+              </a:lnSpc>
+              <a:spcBef>
+                <a:spcPts val="0"/>
+              </a:spcBef>
+              <a:spcAft>
+                <a:spcPts val="0"/>
+              </a:spcAft>
+              <a:buClrTx/>
+              <a:buSzTx/>
+              <a:buFontTx/>
+              <a:buNone/>
+              <a:tabLst/>
+              <a:defRPr/>
+            </a:pPr>
+            <a:r>
+              <a:rPr kumimoji="0" lang="en-US" sz="800" b="0" i="0" u="none" strike="noStrike" kern="1200" cap="none" spc="0" normalizeH="0" baseline="0" noProof="0" dirty="0">
+                <a:ln>
+                  <a:noFill/>
+                </a:ln>
+                <a:solidFill>
+                  <a:prstClr val="black"/>
+                </a:solidFill>
+                <a:effectLst/>
+                <a:uLnTx/>
+                <a:uFillTx/>
+                <a:latin typeface="Segoe UI" panose="020B0502040204020203" pitchFamily="34" charset="0"/>
+                <a:ea typeface="+mn-ea"/>
+                <a:cs typeface="Segoe UI" panose="020B0502040204020203" pitchFamily="34" charset="0"/>
+              </a:rPr>
+              <a:t>Kernel</a:t>
+            </a:r>
+          </a:p>
+        </p:txBody>
+      </p:sp>
+      <p:sp>
+        <p:nvSpPr>
+          <p:cNvPr id="55" name="TextBox 54">
+            <a:extLst>
+              <a:ext uri="{FF2B5EF4-FFF2-40B4-BE49-F238E27FC236}">
+                <a16:creationId xmlns:a16="http://schemas.microsoft.com/office/drawing/2014/main" id="{282E1F6E-6194-994A-F0A3-1E2A85815ED7}"/>
+              </a:ext>
+            </a:extLst>
+          </p:cNvPr>
+          <p:cNvSpPr txBox="1"/>
+          <p:nvPr/>
+        </p:nvSpPr>
+        <p:spPr>
+          <a:xfrm>
+            <a:off x="5416484" y="2890901"/>
+            <a:ext cx="852284" cy="338554"/>
+          </a:xfrm>
+          <a:prstGeom prst="rect">
+            <a:avLst/>
+          </a:prstGeom>
+          <a:noFill/>
+        </p:spPr>
+        <p:txBody>
+          <a:bodyPr wrap="square">
+            <a:spAutoFit/>
+          </a:bodyPr>
+          <a:lstStyle/>
+          <a:p>
+            <a:pPr marL="0" marR="0" lvl="0" indent="0" algn="ctr" defTabSz="914400" rtl="0" eaLnBrk="1" fontAlgn="auto" latinLnBrk="0" hangingPunct="1">
+              <a:lnSpc>
+                <a:spcPct val="100000"/>
+              </a:lnSpc>
+              <a:spcBef>
+                <a:spcPts val="0"/>
+              </a:spcBef>
+              <a:spcAft>
+                <a:spcPts val="0"/>
+              </a:spcAft>
+              <a:buClrTx/>
+              <a:buSzTx/>
+              <a:buFontTx/>
+              <a:buNone/>
+              <a:tabLst/>
+              <a:defRPr/>
+            </a:pPr>
+            <a:r>
+              <a:rPr kumimoji="0" lang="en-US" sz="800" b="0" i="0" u="none" strike="noStrike" kern="1200" cap="none" spc="0" normalizeH="0" baseline="0" noProof="0" dirty="0">
+                <a:ln>
+                  <a:noFill/>
+                </a:ln>
+                <a:solidFill>
+                  <a:prstClr val="black"/>
+                </a:solidFill>
+                <a:effectLst/>
+                <a:uLnTx/>
+                <a:uFillTx/>
+                <a:latin typeface="Segoe UI" panose="020B0502040204020203" pitchFamily="34" charset="0"/>
+                <a:ea typeface="+mn-ea"/>
+                <a:cs typeface="Segoe UI" panose="020B0502040204020203" pitchFamily="34" charset="0"/>
+              </a:rPr>
+              <a:t>Model Context Protocol</a:t>
+            </a:r>
+          </a:p>
+        </p:txBody>
+      </p:sp>
+      <p:sp>
+        <p:nvSpPr>
+          <p:cNvPr id="56" name="TextBox 55">
+            <a:extLst>
+              <a:ext uri="{FF2B5EF4-FFF2-40B4-BE49-F238E27FC236}">
+                <a16:creationId xmlns:a16="http://schemas.microsoft.com/office/drawing/2014/main" id="{9234BCD2-2132-026F-7921-A4F0E63719AD}"/>
+              </a:ext>
+            </a:extLst>
+          </p:cNvPr>
+          <p:cNvSpPr txBox="1"/>
+          <p:nvPr/>
+        </p:nvSpPr>
+        <p:spPr>
+          <a:xfrm>
+            <a:off x="6812444" y="2931903"/>
+            <a:ext cx="604720" cy="215444"/>
+          </a:xfrm>
+          <a:prstGeom prst="rect">
+            <a:avLst/>
+          </a:prstGeom>
+          <a:noFill/>
+        </p:spPr>
+        <p:txBody>
+          <a:bodyPr wrap="square">
+            <a:spAutoFit/>
+          </a:bodyPr>
+          <a:lstStyle/>
+          <a:p>
+            <a:pPr marL="0" marR="0" lvl="0" indent="0" algn="ctr" defTabSz="914400" rtl="0" eaLnBrk="1" fontAlgn="auto" latinLnBrk="0" hangingPunct="1">
+              <a:lnSpc>
+                <a:spcPct val="100000"/>
+              </a:lnSpc>
+              <a:spcBef>
+                <a:spcPts val="0"/>
+              </a:spcBef>
+              <a:spcAft>
+                <a:spcPts val="0"/>
+              </a:spcAft>
+              <a:buClrTx/>
+              <a:buSzTx/>
+              <a:buFontTx/>
+              <a:buNone/>
+              <a:tabLst/>
+              <a:defRPr/>
+            </a:pPr>
+            <a:r>
+              <a:rPr kumimoji="0" lang="en-US" sz="800" b="0" i="0" u="none" strike="noStrike" kern="1200" cap="none" spc="0" normalizeH="0" baseline="0" noProof="0" dirty="0">
+                <a:ln>
+                  <a:noFill/>
+                </a:ln>
+                <a:solidFill>
+                  <a:prstClr val="black"/>
+                </a:solidFill>
+                <a:effectLst/>
+                <a:uLnTx/>
+                <a:uFillTx/>
+                <a:latin typeface="Segoe UI" panose="020B0502040204020203" pitchFamily="34" charset="0"/>
+                <a:ea typeface="+mn-ea"/>
+                <a:cs typeface="Segoe UI" panose="020B0502040204020203" pitchFamily="34" charset="0"/>
+              </a:rPr>
+              <a:t>C#</a:t>
+            </a:r>
+          </a:p>
+        </p:txBody>
+      </p:sp>
+      <p:sp>
+        <p:nvSpPr>
+          <p:cNvPr id="58" name="Rectangle: Rounded Corners 57">
+            <a:extLst>
+              <a:ext uri="{FF2B5EF4-FFF2-40B4-BE49-F238E27FC236}">
+                <a16:creationId xmlns:a16="http://schemas.microsoft.com/office/drawing/2014/main" id="{DC1CA802-B794-0CF1-9455-D04D93565294}"/>
+              </a:ext>
+            </a:extLst>
+          </p:cNvPr>
+          <p:cNvSpPr/>
+          <p:nvPr/>
+        </p:nvSpPr>
+        <p:spPr>
+          <a:xfrm>
+            <a:off x="8169033" y="2110236"/>
+            <a:ext cx="2047461" cy="1103244"/>
+          </a:xfrm>
+          <a:prstGeom prst="roundRect">
+            <a:avLst/>
+          </a:prstGeom>
+          <a:solidFill>
+            <a:schemeClr val="bg1"/>
+          </a:solidFill>
+          <a:ln>
+            <a:solidFill>
+              <a:schemeClr val="tx1"/>
+            </a:solidFill>
+          </a:ln>
+        </p:spPr>
+        <p:style>
+          <a:lnRef idx="2">
+            <a:schemeClr val="accent1">
+              <a:shade val="15000"/>
+            </a:schemeClr>
+          </a:lnRef>
+          <a:fillRef idx="1">
+            <a:schemeClr val="accent1"/>
+          </a:fillRef>
+          <a:effectRef idx="0">
+            <a:schemeClr val="accent1"/>
+          </a:effectRef>
+          <a:fontRef idx="minor">
+            <a:schemeClr val="lt1"/>
+          </a:fontRef>
+        </p:style>
+        <p:txBody>
+          <a:bodyPr rtlCol="0" anchor="ctr"/>
+          <a:lstStyle/>
+          <a:p>
+            <a:pPr marL="0" marR="0" lvl="0" indent="0" algn="ctr" defTabSz="914400" rtl="0" eaLnBrk="1" fontAlgn="auto" latinLnBrk="0" hangingPunct="1">
+              <a:lnSpc>
+                <a:spcPct val="100000"/>
+              </a:lnSpc>
+              <a:spcBef>
+                <a:spcPts val="0"/>
+              </a:spcBef>
+              <a:spcAft>
+                <a:spcPts val="0"/>
+              </a:spcAft>
+              <a:buClrTx/>
+              <a:buSzTx/>
+              <a:buFontTx/>
+              <a:buNone/>
+              <a:tabLst/>
+              <a:defRPr/>
+            </a:pPr>
+            <a:endParaRPr kumimoji="0" lang="en-US" sz="1800" b="0" i="0" u="none" strike="noStrike" kern="1200" cap="none" spc="0" normalizeH="0" baseline="0" noProof="0" dirty="0">
+              <a:ln>
+                <a:noFill/>
+              </a:ln>
+              <a:solidFill>
+                <a:prstClr val="white"/>
+              </a:solidFill>
+              <a:effectLst/>
+              <a:uLnTx/>
+              <a:uFillTx/>
+              <a:latin typeface="Aptos" panose="02110004020202020204"/>
+              <a:ea typeface="+mn-ea"/>
+              <a:cs typeface="+mn-cs"/>
+            </a:endParaRPr>
+          </a:p>
+        </p:txBody>
+      </p:sp>
+      <p:sp>
+        <p:nvSpPr>
+          <p:cNvPr id="59" name="TextBox 58">
+            <a:extLst>
+              <a:ext uri="{FF2B5EF4-FFF2-40B4-BE49-F238E27FC236}">
+                <a16:creationId xmlns:a16="http://schemas.microsoft.com/office/drawing/2014/main" id="{9F1BCAE6-670B-0AD9-AAA5-186DC2FAA921}"/>
+              </a:ext>
+            </a:extLst>
+          </p:cNvPr>
+          <p:cNvSpPr txBox="1"/>
+          <p:nvPr/>
+        </p:nvSpPr>
+        <p:spPr>
+          <a:xfrm>
+            <a:off x="8733258" y="2097208"/>
+            <a:ext cx="1471172" cy="492443"/>
+          </a:xfrm>
+          <a:prstGeom prst="rect">
+            <a:avLst/>
+          </a:prstGeom>
+          <a:noFill/>
+        </p:spPr>
+        <p:txBody>
+          <a:bodyPr wrap="square">
+            <a:spAutoFit/>
+          </a:bodyPr>
+          <a:lstStyle/>
+          <a:p>
+            <a:pPr marL="0" marR="0" lvl="0" indent="0" algn="ctr" defTabSz="914400" rtl="0" eaLnBrk="1" fontAlgn="auto" latinLnBrk="0" hangingPunct="1">
+              <a:lnSpc>
+                <a:spcPct val="100000"/>
+              </a:lnSpc>
+              <a:spcBef>
+                <a:spcPts val="0"/>
+              </a:spcBef>
+              <a:spcAft>
+                <a:spcPts val="0"/>
+              </a:spcAft>
+              <a:buClrTx/>
+              <a:buSzTx/>
+              <a:buFontTx/>
+              <a:buNone/>
+              <a:tabLst/>
+              <a:defRPr/>
+            </a:pPr>
+            <a:r>
+              <a:rPr kumimoji="0" lang="en-US" sz="1400" b="0" i="0" u="none" strike="noStrike" kern="1200" cap="none" spc="0" normalizeH="0" baseline="0" noProof="0" dirty="0">
+                <a:ln>
+                  <a:noFill/>
+                </a:ln>
+                <a:solidFill>
+                  <a:prstClr val="black"/>
+                </a:solidFill>
+                <a:effectLst/>
+                <a:uLnTx/>
+                <a:uFillTx/>
+                <a:latin typeface="Segoe UI" panose="020B0502040204020203" pitchFamily="34" charset="0"/>
+                <a:ea typeface="+mn-ea"/>
+                <a:cs typeface="Segoe UI" panose="020B0502040204020203" pitchFamily="34" charset="0"/>
+              </a:rPr>
+              <a:t>AI Agent</a:t>
+            </a:r>
+          </a:p>
+          <a:p>
+            <a:pPr algn="ctr"/>
+            <a:r>
+              <a:rPr lang="en-US" sz="1200" dirty="0">
+                <a:solidFill>
+                  <a:prstClr val="white">
+                    <a:lumMod val="50000"/>
+                  </a:prstClr>
+                </a:solidFill>
+                <a:latin typeface="Segoe UI" panose="020B0502040204020203" pitchFamily="34" charset="0"/>
+                <a:cs typeface="Segoe UI" panose="020B0502040204020203" pitchFamily="34" charset="0"/>
+              </a:rPr>
+              <a:t>Chat Agent</a:t>
+            </a:r>
+          </a:p>
+        </p:txBody>
+      </p:sp>
+      <p:pic>
+        <p:nvPicPr>
+          <p:cNvPr id="60" name="Picture 59">
+            <a:extLst>
+              <a:ext uri="{FF2B5EF4-FFF2-40B4-BE49-F238E27FC236}">
+                <a16:creationId xmlns:a16="http://schemas.microsoft.com/office/drawing/2014/main" id="{B930D32E-D55A-BC7E-346B-38D688EBD1EA}"/>
+              </a:ext>
+            </a:extLst>
+          </p:cNvPr>
+          <p:cNvPicPr>
+            <a:picLocks noChangeAspect="1"/>
+          </p:cNvPicPr>
+          <p:nvPr/>
+        </p:nvPicPr>
+        <p:blipFill>
+          <a:blip r:embed="rId3"/>
+          <a:stretch>
+            <a:fillRect/>
+          </a:stretch>
+        </p:blipFill>
+        <p:spPr>
+          <a:xfrm>
+            <a:off x="8283389" y="2143406"/>
+            <a:ext cx="500312" cy="443353"/>
+          </a:xfrm>
+          <a:prstGeom prst="rect">
+            <a:avLst/>
+          </a:prstGeom>
+        </p:spPr>
+      </p:pic>
+      <p:pic>
+        <p:nvPicPr>
+          <p:cNvPr id="61" name="Picture 6" descr="Semantic Kernel Roadmap H1 2025 ...">
+            <a:extLst>
+              <a:ext uri="{FF2B5EF4-FFF2-40B4-BE49-F238E27FC236}">
+                <a16:creationId xmlns:a16="http://schemas.microsoft.com/office/drawing/2014/main" id="{951BC739-38BB-A92E-D4C1-5A052CF4FA79}"/>
+              </a:ext>
+            </a:extLst>
+          </p:cNvPr>
+          <p:cNvPicPr>
+            <a:picLocks noChangeAspect="1" noChangeArrowheads="1"/>
+          </p:cNvPicPr>
+          <p:nvPr/>
+        </p:nvPicPr>
+        <p:blipFill rotWithShape="1">
+          <a:blip r:embed="rId6">
+            <a:clrChange>
+              <a:clrFrom>
+                <a:srgbClr val="FFFFFF"/>
+              </a:clrFrom>
+              <a:clrTo>
+                <a:srgbClr val="FFFFFF">
+                  <a:alpha val="0"/>
+                </a:srgbClr>
+              </a:clrTo>
+            </a:clrChange>
+            <a:extLst>
+              <a:ext uri="{28A0092B-C50C-407E-A947-70E740481C1C}">
+                <a14:useLocalDpi xmlns:a14="http://schemas.microsoft.com/office/drawing/2010/main" val="0"/>
+              </a:ext>
+            </a:extLst>
+          </a:blip>
+          <a:srcRect l="28311" r="23923" b="24870"/>
+          <a:stretch>
+            <a:fillRect/>
+          </a:stretch>
+        </p:blipFill>
+        <p:spPr bwMode="auto">
+          <a:xfrm>
+            <a:off x="8788874" y="2673417"/>
+            <a:ext cx="200765" cy="258486"/>
+          </a:xfrm>
+          <a:prstGeom prst="rect">
+            <a:avLst/>
+          </a:prstGeom>
+          <a:noFill/>
+          <a:extLst>
+            <a:ext uri="{909E8E84-426E-40DD-AFC4-6F175D3DCCD1}">
+              <a14:hiddenFill xmlns:a14="http://schemas.microsoft.com/office/drawing/2010/main">
+                <a:solidFill>
+                  <a:srgbClr val="FFFFFF"/>
+                </a:solidFill>
+              </a14:hiddenFill>
+            </a:ext>
+          </a:extLst>
+        </p:spPr>
+      </p:pic>
+      <p:pic>
+        <p:nvPicPr>
+          <p:cNvPr id="63" name="Picture 10" descr="Microsoft Dot Net icon SVG Vector &amp; PNG ...">
+            <a:extLst>
+              <a:ext uri="{FF2B5EF4-FFF2-40B4-BE49-F238E27FC236}">
+                <a16:creationId xmlns:a16="http://schemas.microsoft.com/office/drawing/2014/main" id="{4AB3B8DA-4C71-9A05-B443-8714FC5E389C}"/>
+              </a:ext>
+            </a:extLst>
+          </p:cNvPr>
+          <p:cNvPicPr>
+            <a:picLocks noChangeAspect="1" noChangeArrowheads="1"/>
+          </p:cNvPicPr>
+          <p:nvPr/>
+        </p:nvPicPr>
+        <p:blipFill>
+          <a:blip r:embed="rId8">
+            <a:extLst>
+              <a:ext uri="{28A0092B-C50C-407E-A947-70E740481C1C}">
+                <a14:useLocalDpi xmlns:a14="http://schemas.microsoft.com/office/drawing/2010/main" val="0"/>
+              </a:ext>
+            </a:extLst>
+          </a:blip>
+          <a:srcRect/>
+          <a:stretch>
+            <a:fillRect/>
+          </a:stretch>
+        </p:blipFill>
+        <p:spPr bwMode="auto">
+          <a:xfrm>
+            <a:off x="9337001" y="2677537"/>
+            <a:ext cx="261889" cy="261889"/>
+          </a:xfrm>
+          <a:prstGeom prst="rect">
+            <a:avLst/>
+          </a:prstGeom>
+          <a:noFill/>
+          <a:extLst>
+            <a:ext uri="{909E8E84-426E-40DD-AFC4-6F175D3DCCD1}">
+              <a14:hiddenFill xmlns:a14="http://schemas.microsoft.com/office/drawing/2010/main">
+                <a:solidFill>
+                  <a:srgbClr val="FFFFFF"/>
+                </a:solidFill>
+              </a14:hiddenFill>
+            </a:ext>
+          </a:extLst>
+        </p:spPr>
+      </p:pic>
+      <p:sp>
+        <p:nvSpPr>
+          <p:cNvPr id="23552" name="TextBox 23551">
+            <a:extLst>
+              <a:ext uri="{FF2B5EF4-FFF2-40B4-BE49-F238E27FC236}">
+                <a16:creationId xmlns:a16="http://schemas.microsoft.com/office/drawing/2014/main" id="{F94A16F3-FFD0-9241-8B7A-01005CDA26FF}"/>
+              </a:ext>
+            </a:extLst>
+          </p:cNvPr>
+          <p:cNvSpPr txBox="1"/>
+          <p:nvPr/>
+        </p:nvSpPr>
+        <p:spPr>
+          <a:xfrm>
+            <a:off x="8577839" y="2886547"/>
+            <a:ext cx="604720" cy="338554"/>
+          </a:xfrm>
+          <a:prstGeom prst="rect">
+            <a:avLst/>
+          </a:prstGeom>
+          <a:noFill/>
+        </p:spPr>
+        <p:txBody>
+          <a:bodyPr wrap="square">
+            <a:spAutoFit/>
+          </a:bodyPr>
+          <a:lstStyle/>
+          <a:p>
+            <a:pPr marL="0" marR="0" lvl="0" indent="0" algn="ctr" defTabSz="914400" rtl="0" eaLnBrk="1" fontAlgn="auto" latinLnBrk="0" hangingPunct="1">
+              <a:lnSpc>
+                <a:spcPct val="100000"/>
+              </a:lnSpc>
+              <a:spcBef>
+                <a:spcPts val="0"/>
+              </a:spcBef>
+              <a:spcAft>
+                <a:spcPts val="0"/>
+              </a:spcAft>
+              <a:buClrTx/>
+              <a:buSzTx/>
+              <a:buFontTx/>
+              <a:buNone/>
+              <a:tabLst/>
+              <a:defRPr/>
+            </a:pPr>
+            <a:r>
+              <a:rPr kumimoji="0" lang="en-US" sz="800" b="0" i="0" u="none" strike="noStrike" kern="1200" cap="none" spc="0" normalizeH="0" baseline="0" noProof="0" dirty="0">
+                <a:ln>
+                  <a:noFill/>
+                </a:ln>
+                <a:solidFill>
+                  <a:prstClr val="black"/>
+                </a:solidFill>
+                <a:effectLst/>
+                <a:uLnTx/>
+                <a:uFillTx/>
+                <a:latin typeface="Segoe UI" panose="020B0502040204020203" pitchFamily="34" charset="0"/>
+                <a:ea typeface="+mn-ea"/>
+                <a:cs typeface="Segoe UI" panose="020B0502040204020203" pitchFamily="34" charset="0"/>
+              </a:rPr>
+              <a:t>Semantic</a:t>
+            </a:r>
+          </a:p>
+          <a:p>
+            <a:pPr marL="0" marR="0" lvl="0" indent="0" algn="ctr" defTabSz="914400" rtl="0" eaLnBrk="1" fontAlgn="auto" latinLnBrk="0" hangingPunct="1">
+              <a:lnSpc>
+                <a:spcPct val="100000"/>
+              </a:lnSpc>
+              <a:spcBef>
+                <a:spcPts val="0"/>
+              </a:spcBef>
+              <a:spcAft>
+                <a:spcPts val="0"/>
+              </a:spcAft>
+              <a:buClrTx/>
+              <a:buSzTx/>
+              <a:buFontTx/>
+              <a:buNone/>
+              <a:tabLst/>
+              <a:defRPr/>
+            </a:pPr>
+            <a:r>
+              <a:rPr kumimoji="0" lang="en-US" sz="800" b="0" i="0" u="none" strike="noStrike" kern="1200" cap="none" spc="0" normalizeH="0" baseline="0" noProof="0" dirty="0">
+                <a:ln>
+                  <a:noFill/>
+                </a:ln>
+                <a:solidFill>
+                  <a:prstClr val="black"/>
+                </a:solidFill>
+                <a:effectLst/>
+                <a:uLnTx/>
+                <a:uFillTx/>
+                <a:latin typeface="Segoe UI" panose="020B0502040204020203" pitchFamily="34" charset="0"/>
+                <a:ea typeface="+mn-ea"/>
+                <a:cs typeface="Segoe UI" panose="020B0502040204020203" pitchFamily="34" charset="0"/>
+              </a:rPr>
+              <a:t>Kernel</a:t>
+            </a:r>
+          </a:p>
+        </p:txBody>
+      </p:sp>
+      <p:sp>
+        <p:nvSpPr>
+          <p:cNvPr id="23555" name="TextBox 23554">
+            <a:extLst>
+              <a:ext uri="{FF2B5EF4-FFF2-40B4-BE49-F238E27FC236}">
+                <a16:creationId xmlns:a16="http://schemas.microsoft.com/office/drawing/2014/main" id="{970B9F47-CE0D-5D2F-D352-BE3CB2C11FCF}"/>
+              </a:ext>
+            </a:extLst>
+          </p:cNvPr>
+          <p:cNvSpPr txBox="1"/>
+          <p:nvPr/>
+        </p:nvSpPr>
+        <p:spPr>
+          <a:xfrm>
+            <a:off x="9186984" y="2931903"/>
+            <a:ext cx="604720" cy="215444"/>
+          </a:xfrm>
+          <a:prstGeom prst="rect">
+            <a:avLst/>
+          </a:prstGeom>
+          <a:noFill/>
+        </p:spPr>
+        <p:txBody>
+          <a:bodyPr wrap="square">
+            <a:spAutoFit/>
+          </a:bodyPr>
+          <a:lstStyle/>
+          <a:p>
+            <a:pPr marL="0" marR="0" lvl="0" indent="0" algn="ctr" defTabSz="914400" rtl="0" eaLnBrk="1" fontAlgn="auto" latinLnBrk="0" hangingPunct="1">
+              <a:lnSpc>
+                <a:spcPct val="100000"/>
+              </a:lnSpc>
+              <a:spcBef>
+                <a:spcPts val="0"/>
+              </a:spcBef>
+              <a:spcAft>
+                <a:spcPts val="0"/>
+              </a:spcAft>
+              <a:buClrTx/>
+              <a:buSzTx/>
+              <a:buFontTx/>
+              <a:buNone/>
+              <a:tabLst/>
+              <a:defRPr/>
+            </a:pPr>
+            <a:r>
+              <a:rPr kumimoji="0" lang="en-US" sz="800" b="0" i="0" u="none" strike="noStrike" kern="1200" cap="none" spc="0" normalizeH="0" baseline="0" noProof="0" dirty="0">
+                <a:ln>
+                  <a:noFill/>
+                </a:ln>
+                <a:solidFill>
+                  <a:prstClr val="black"/>
+                </a:solidFill>
+                <a:effectLst/>
+                <a:uLnTx/>
+                <a:uFillTx/>
+                <a:latin typeface="Segoe UI" panose="020B0502040204020203" pitchFamily="34" charset="0"/>
+                <a:ea typeface="+mn-ea"/>
+                <a:cs typeface="Segoe UI" panose="020B0502040204020203" pitchFamily="34" charset="0"/>
+              </a:rPr>
+              <a:t>C#</a:t>
+            </a:r>
+          </a:p>
+        </p:txBody>
+      </p:sp>
+      <p:sp>
+        <p:nvSpPr>
+          <p:cNvPr id="23557" name="Flowchart: Connector 23556">
+            <a:extLst>
+              <a:ext uri="{FF2B5EF4-FFF2-40B4-BE49-F238E27FC236}">
+                <a16:creationId xmlns:a16="http://schemas.microsoft.com/office/drawing/2014/main" id="{FDEFFD87-CFA7-4D06-2546-02D4C6104873}"/>
+              </a:ext>
+            </a:extLst>
+          </p:cNvPr>
+          <p:cNvSpPr>
+            <a:spLocks noChangeAspect="1"/>
+          </p:cNvSpPr>
+          <p:nvPr/>
+        </p:nvSpPr>
+        <p:spPr>
+          <a:xfrm>
+            <a:off x="7111141" y="3541297"/>
+            <a:ext cx="439592" cy="439592"/>
+          </a:xfrm>
+          <a:prstGeom prst="flowChartConnector">
+            <a:avLst/>
+          </a:prstGeom>
+          <a:solidFill>
+            <a:schemeClr val="bg1"/>
+          </a:solidFill>
+          <a:ln>
+            <a:solidFill>
+              <a:schemeClr val="tx1"/>
+            </a:solidFill>
+          </a:ln>
+        </p:spPr>
+        <p:style>
+          <a:lnRef idx="2">
+            <a:schemeClr val="accent1">
+              <a:shade val="15000"/>
+            </a:schemeClr>
+          </a:lnRef>
+          <a:fillRef idx="1">
+            <a:schemeClr val="accent1"/>
+          </a:fillRef>
+          <a:effectRef idx="0">
+            <a:schemeClr val="accent1"/>
+          </a:effectRef>
+          <a:fontRef idx="minor">
+            <a:schemeClr val="lt1"/>
+          </a:fontRef>
+        </p:style>
+        <p:txBody>
+          <a:bodyPr rtlCol="0" anchor="ctr"/>
+          <a:lstStyle/>
+          <a:p>
+            <a:pPr marL="0" marR="0" lvl="0" indent="0" algn="ctr" defTabSz="914400" rtl="0" eaLnBrk="1" fontAlgn="auto" latinLnBrk="0" hangingPunct="1">
+              <a:lnSpc>
+                <a:spcPct val="100000"/>
+              </a:lnSpc>
+              <a:spcBef>
+                <a:spcPts val="0"/>
+              </a:spcBef>
+              <a:spcAft>
+                <a:spcPts val="0"/>
+              </a:spcAft>
+              <a:buClrTx/>
+              <a:buSzTx/>
+              <a:buFontTx/>
+              <a:buNone/>
+              <a:tabLst/>
+              <a:defRPr/>
+            </a:pPr>
+            <a:endParaRPr kumimoji="0" lang="en-US" sz="1800" b="0" i="0" u="none" strike="noStrike" kern="1200" cap="none" spc="0" normalizeH="0" baseline="0" noProof="0">
+              <a:ln>
+                <a:noFill/>
+              </a:ln>
+              <a:solidFill>
+                <a:prstClr val="white"/>
+              </a:solidFill>
+              <a:effectLst/>
+              <a:uLnTx/>
+              <a:uFillTx/>
+              <a:latin typeface="Aptos" panose="02110004020202020204"/>
+              <a:ea typeface="+mn-ea"/>
+              <a:cs typeface="+mn-cs"/>
+            </a:endParaRPr>
+          </a:p>
+        </p:txBody>
+      </p:sp>
+      <p:pic>
+        <p:nvPicPr>
+          <p:cNvPr id="23559" name="Picture 2" descr="Here's OpenAI's new logo | The Verge">
+            <a:extLst>
+              <a:ext uri="{FF2B5EF4-FFF2-40B4-BE49-F238E27FC236}">
+                <a16:creationId xmlns:a16="http://schemas.microsoft.com/office/drawing/2014/main" id="{6376F93C-4665-9F23-220A-B1679BD15F43}"/>
+              </a:ext>
+            </a:extLst>
+          </p:cNvPr>
+          <p:cNvPicPr>
+            <a:picLocks noChangeAspect="1" noChangeArrowheads="1"/>
+          </p:cNvPicPr>
+          <p:nvPr/>
+        </p:nvPicPr>
+        <p:blipFill rotWithShape="1">
+          <a:blip r:embed="rId9">
+            <a:extLst>
+              <a:ext uri="{28A0092B-C50C-407E-A947-70E740481C1C}">
+                <a14:useLocalDpi xmlns:a14="http://schemas.microsoft.com/office/drawing/2010/main" val="0"/>
+              </a:ext>
+            </a:extLst>
+          </a:blip>
+          <a:srcRect l="24641" t="10723" r="22473" b="10725"/>
+          <a:stretch>
+            <a:fillRect/>
+          </a:stretch>
+        </p:blipFill>
+        <p:spPr bwMode="auto">
+          <a:xfrm>
+            <a:off x="7231737" y="3662439"/>
+            <a:ext cx="198400" cy="197308"/>
+          </a:xfrm>
+          <a:prstGeom prst="rect">
+            <a:avLst/>
+          </a:prstGeom>
+          <a:noFill/>
+          <a:extLst>
+            <a:ext uri="{909E8E84-426E-40DD-AFC4-6F175D3DCCD1}">
+              <a14:hiddenFill xmlns:a14="http://schemas.microsoft.com/office/drawing/2010/main">
+                <a:solidFill>
+                  <a:srgbClr val="FFFFFF"/>
+                </a:solidFill>
+              </a14:hiddenFill>
+            </a:ext>
+          </a:extLst>
+        </p:spPr>
+      </p:pic>
+      <p:sp>
+        <p:nvSpPr>
+          <p:cNvPr id="23561" name="TextBox 23560">
+            <a:extLst>
+              <a:ext uri="{FF2B5EF4-FFF2-40B4-BE49-F238E27FC236}">
+                <a16:creationId xmlns:a16="http://schemas.microsoft.com/office/drawing/2014/main" id="{2862BE3A-5F25-E1DB-2633-0DF61065DD74}"/>
+              </a:ext>
+            </a:extLst>
+          </p:cNvPr>
+          <p:cNvSpPr txBox="1"/>
+          <p:nvPr/>
+        </p:nvSpPr>
+        <p:spPr>
+          <a:xfrm>
+            <a:off x="7109039" y="3976841"/>
+            <a:ext cx="443795" cy="230832"/>
+          </a:xfrm>
+          <a:prstGeom prst="rect">
+            <a:avLst/>
+          </a:prstGeom>
+          <a:noFill/>
+        </p:spPr>
+        <p:txBody>
+          <a:bodyPr wrap="square">
+            <a:spAutoFit/>
+          </a:bodyPr>
+          <a:lstStyle/>
+          <a:p>
+            <a:pPr marL="0" marR="0" lvl="0" indent="0" algn="ctr" defTabSz="914400" rtl="0" eaLnBrk="1" fontAlgn="auto" latinLnBrk="0" hangingPunct="1">
+              <a:lnSpc>
+                <a:spcPct val="100000"/>
+              </a:lnSpc>
+              <a:spcBef>
+                <a:spcPts val="0"/>
+              </a:spcBef>
+              <a:spcAft>
+                <a:spcPts val="0"/>
+              </a:spcAft>
+              <a:buClrTx/>
+              <a:buSzTx/>
+              <a:buFontTx/>
+              <a:buNone/>
+              <a:tabLst/>
+              <a:defRPr/>
+            </a:pPr>
+            <a:r>
+              <a:rPr kumimoji="0" lang="en-US" sz="900" b="0" i="0" u="none" strike="noStrike" kern="1200" cap="none" spc="0" normalizeH="0" baseline="0" noProof="0" dirty="0">
+                <a:ln>
+                  <a:noFill/>
+                </a:ln>
+                <a:solidFill>
+                  <a:prstClr val="black"/>
+                </a:solidFill>
+                <a:effectLst/>
+                <a:uLnTx/>
+                <a:uFillTx/>
+                <a:latin typeface="Segoe UI" panose="020B0502040204020203" pitchFamily="34" charset="0"/>
+                <a:ea typeface="+mn-ea"/>
+                <a:cs typeface="Segoe UI" panose="020B0502040204020203" pitchFamily="34" charset="0"/>
+              </a:rPr>
+              <a:t>LLM</a:t>
+            </a:r>
+          </a:p>
+        </p:txBody>
+      </p:sp>
+      <p:sp>
+        <p:nvSpPr>
+          <p:cNvPr id="23563" name="Rectangle: Rounded Corners 23562">
+            <a:extLst>
+              <a:ext uri="{FF2B5EF4-FFF2-40B4-BE49-F238E27FC236}">
+                <a16:creationId xmlns:a16="http://schemas.microsoft.com/office/drawing/2014/main" id="{A736A2E6-BFE6-36C3-0834-4D5115C7911E}"/>
+              </a:ext>
+            </a:extLst>
+          </p:cNvPr>
+          <p:cNvSpPr/>
+          <p:nvPr/>
+        </p:nvSpPr>
+        <p:spPr>
+          <a:xfrm>
+            <a:off x="6934740" y="4426816"/>
+            <a:ext cx="2047461" cy="1103244"/>
+          </a:xfrm>
+          <a:prstGeom prst="roundRect">
+            <a:avLst/>
+          </a:prstGeom>
+          <a:solidFill>
+            <a:schemeClr val="bg1"/>
+          </a:solidFill>
+          <a:ln>
+            <a:solidFill>
+              <a:schemeClr val="tx1"/>
+            </a:solidFill>
+          </a:ln>
+        </p:spPr>
+        <p:style>
+          <a:lnRef idx="2">
+            <a:schemeClr val="accent1">
+              <a:shade val="15000"/>
+            </a:schemeClr>
+          </a:lnRef>
+          <a:fillRef idx="1">
+            <a:schemeClr val="accent1"/>
+          </a:fillRef>
+          <a:effectRef idx="0">
+            <a:schemeClr val="accent1"/>
+          </a:effectRef>
+          <a:fontRef idx="minor">
+            <a:schemeClr val="lt1"/>
+          </a:fontRef>
+        </p:style>
+        <p:txBody>
+          <a:bodyPr rtlCol="0" anchor="ctr"/>
+          <a:lstStyle/>
+          <a:p>
+            <a:pPr marL="0" marR="0" lvl="0" indent="0" algn="ctr" defTabSz="914400" rtl="0" eaLnBrk="1" fontAlgn="auto" latinLnBrk="0" hangingPunct="1">
+              <a:lnSpc>
+                <a:spcPct val="100000"/>
+              </a:lnSpc>
+              <a:spcBef>
+                <a:spcPts val="0"/>
+              </a:spcBef>
+              <a:spcAft>
+                <a:spcPts val="0"/>
+              </a:spcAft>
+              <a:buClrTx/>
+              <a:buSzTx/>
+              <a:buFontTx/>
+              <a:buNone/>
+              <a:tabLst/>
+              <a:defRPr/>
+            </a:pPr>
+            <a:endParaRPr kumimoji="0" lang="en-US" sz="1800" b="0" i="0" u="none" strike="noStrike" kern="1200" cap="none" spc="0" normalizeH="0" baseline="0" noProof="0" dirty="0">
+              <a:ln>
+                <a:noFill/>
+              </a:ln>
+              <a:solidFill>
+                <a:prstClr val="white"/>
+              </a:solidFill>
+              <a:effectLst/>
+              <a:uLnTx/>
+              <a:uFillTx/>
+              <a:latin typeface="Aptos" panose="02110004020202020204"/>
+              <a:ea typeface="+mn-ea"/>
+              <a:cs typeface="+mn-cs"/>
+            </a:endParaRPr>
+          </a:p>
+        </p:txBody>
+      </p:sp>
+      <p:sp>
+        <p:nvSpPr>
+          <p:cNvPr id="23565" name="TextBox 23564">
+            <a:extLst>
+              <a:ext uri="{FF2B5EF4-FFF2-40B4-BE49-F238E27FC236}">
+                <a16:creationId xmlns:a16="http://schemas.microsoft.com/office/drawing/2014/main" id="{D0D3ED3A-1778-C263-3A83-1876F2C413E7}"/>
+              </a:ext>
+            </a:extLst>
+          </p:cNvPr>
+          <p:cNvSpPr txBox="1"/>
+          <p:nvPr/>
+        </p:nvSpPr>
+        <p:spPr>
+          <a:xfrm>
+            <a:off x="7487287" y="4413788"/>
+            <a:ext cx="1552064" cy="523220"/>
+          </a:xfrm>
+          <a:prstGeom prst="rect">
+            <a:avLst/>
+          </a:prstGeom>
+          <a:noFill/>
+        </p:spPr>
+        <p:txBody>
+          <a:bodyPr wrap="square">
+            <a:spAutoFit/>
+          </a:bodyPr>
+          <a:lstStyle/>
+          <a:p>
+            <a:pPr marL="0" marR="0" lvl="0" indent="0" algn="ctr" defTabSz="914400" rtl="0" eaLnBrk="1" fontAlgn="auto" latinLnBrk="0" hangingPunct="1">
+              <a:lnSpc>
+                <a:spcPct val="100000"/>
+              </a:lnSpc>
+              <a:spcBef>
+                <a:spcPts val="0"/>
+              </a:spcBef>
+              <a:spcAft>
+                <a:spcPts val="0"/>
+              </a:spcAft>
+              <a:buClrTx/>
+              <a:buSzTx/>
+              <a:buFontTx/>
+              <a:buNone/>
+              <a:tabLst/>
+              <a:defRPr/>
+            </a:pPr>
+            <a:r>
+              <a:rPr kumimoji="0" lang="en-US" sz="1400" b="0" i="0" u="none" strike="noStrike" kern="1200" cap="none" spc="0" normalizeH="0" baseline="0" noProof="0" dirty="0">
+                <a:ln>
+                  <a:noFill/>
+                </a:ln>
+                <a:solidFill>
+                  <a:prstClr val="black"/>
+                </a:solidFill>
+                <a:effectLst/>
+                <a:uLnTx/>
+                <a:uFillTx/>
+                <a:latin typeface="Segoe UI" panose="020B0502040204020203" pitchFamily="34" charset="0"/>
+                <a:ea typeface="+mn-ea"/>
+                <a:cs typeface="Segoe UI" panose="020B0502040204020203" pitchFamily="34" charset="0"/>
+              </a:rPr>
+              <a:t>MCP Server</a:t>
+            </a:r>
+          </a:p>
+          <a:p>
+            <a:pPr marL="0" marR="0" lvl="0" indent="0" algn="ctr" defTabSz="914400" rtl="0" eaLnBrk="1" fontAlgn="auto" latinLnBrk="0" hangingPunct="1">
+              <a:lnSpc>
+                <a:spcPct val="100000"/>
+              </a:lnSpc>
+              <a:spcBef>
+                <a:spcPts val="0"/>
+              </a:spcBef>
+              <a:spcAft>
+                <a:spcPts val="0"/>
+              </a:spcAft>
+              <a:buClrTx/>
+              <a:buSzTx/>
+              <a:buFontTx/>
+              <a:buNone/>
+              <a:tabLst/>
+              <a:defRPr/>
+            </a:pPr>
+            <a:r>
+              <a:rPr kumimoji="0" lang="en-US" sz="1400" b="0" i="0" u="none" strike="noStrike" kern="1200" cap="none" spc="0" normalizeH="0" baseline="0" noProof="0" dirty="0">
+                <a:ln>
+                  <a:noFill/>
+                </a:ln>
+                <a:solidFill>
+                  <a:prstClr val="white">
+                    <a:lumMod val="50000"/>
+                  </a:prstClr>
+                </a:solidFill>
+                <a:effectLst/>
+                <a:uLnTx/>
+                <a:uFillTx/>
+                <a:latin typeface="Segoe UI" panose="020B0502040204020203" pitchFamily="34" charset="0"/>
+                <a:ea typeface="+mn-ea"/>
+                <a:cs typeface="Segoe UI" panose="020B0502040204020203" pitchFamily="34" charset="0"/>
+              </a:rPr>
+              <a:t>KB Content</a:t>
+            </a:r>
+          </a:p>
+        </p:txBody>
+      </p:sp>
+      <p:pic>
+        <p:nvPicPr>
+          <p:cNvPr id="23570" name="Picture 8" descr="MCP (Model Context Protocol) Logo Fr ...">
+            <a:extLst>
+              <a:ext uri="{FF2B5EF4-FFF2-40B4-BE49-F238E27FC236}">
+                <a16:creationId xmlns:a16="http://schemas.microsoft.com/office/drawing/2014/main" id="{8718C603-2FE3-B132-0BEC-A8B6D47282F0}"/>
+              </a:ext>
+            </a:extLst>
+          </p:cNvPr>
+          <p:cNvPicPr>
+            <a:picLocks noChangeAspect="1" noChangeArrowheads="1"/>
+          </p:cNvPicPr>
+          <p:nvPr/>
+        </p:nvPicPr>
+        <p:blipFill>
+          <a:blip r:embed="rId7">
+            <a:extLst>
+              <a:ext uri="{28A0092B-C50C-407E-A947-70E740481C1C}">
+                <a14:useLocalDpi xmlns:a14="http://schemas.microsoft.com/office/drawing/2010/main" val="0"/>
+              </a:ext>
+            </a:extLst>
+          </a:blip>
+          <a:srcRect/>
+          <a:stretch>
+            <a:fillRect/>
+          </a:stretch>
+        </p:blipFill>
+        <p:spPr bwMode="auto">
+          <a:xfrm>
+            <a:off x="7150560" y="4989997"/>
+            <a:ext cx="261889" cy="261889"/>
+          </a:xfrm>
+          <a:prstGeom prst="rect">
+            <a:avLst/>
+          </a:prstGeom>
+          <a:noFill/>
+          <a:extLst>
+            <a:ext uri="{909E8E84-426E-40DD-AFC4-6F175D3DCCD1}">
+              <a14:hiddenFill xmlns:a14="http://schemas.microsoft.com/office/drawing/2010/main">
+                <a:solidFill>
+                  <a:srgbClr val="FFFFFF"/>
+                </a:solidFill>
+              </a14:hiddenFill>
+            </a:ext>
+          </a:extLst>
+        </p:spPr>
+      </p:pic>
+      <p:pic>
+        <p:nvPicPr>
+          <p:cNvPr id="23571" name="Picture 10" descr="Microsoft Dot Net icon SVG Vector &amp; PNG ...">
+            <a:extLst>
+              <a:ext uri="{FF2B5EF4-FFF2-40B4-BE49-F238E27FC236}">
+                <a16:creationId xmlns:a16="http://schemas.microsoft.com/office/drawing/2014/main" id="{A8A43CBD-CAE7-188E-82D0-C09A1D1F2BB9}"/>
+              </a:ext>
+            </a:extLst>
+          </p:cNvPr>
+          <p:cNvPicPr>
+            <a:picLocks noChangeAspect="1" noChangeArrowheads="1"/>
+          </p:cNvPicPr>
+          <p:nvPr/>
+        </p:nvPicPr>
+        <p:blipFill>
+          <a:blip r:embed="rId8">
+            <a:extLst>
+              <a:ext uri="{28A0092B-C50C-407E-A947-70E740481C1C}">
+                <a14:useLocalDpi xmlns:a14="http://schemas.microsoft.com/office/drawing/2010/main" val="0"/>
+              </a:ext>
+            </a:extLst>
+          </a:blip>
+          <a:srcRect/>
+          <a:stretch>
+            <a:fillRect/>
+          </a:stretch>
+        </p:blipFill>
+        <p:spPr bwMode="auto">
+          <a:xfrm>
+            <a:off x="8415225" y="4994117"/>
+            <a:ext cx="261889" cy="261889"/>
+          </a:xfrm>
+          <a:prstGeom prst="rect">
+            <a:avLst/>
+          </a:prstGeom>
+          <a:noFill/>
+          <a:extLst>
+            <a:ext uri="{909E8E84-426E-40DD-AFC4-6F175D3DCCD1}">
+              <a14:hiddenFill xmlns:a14="http://schemas.microsoft.com/office/drawing/2010/main">
+                <a:solidFill>
+                  <a:srgbClr val="FFFFFF"/>
+                </a:solidFill>
+              </a14:hiddenFill>
+            </a:ext>
+          </a:extLst>
+        </p:spPr>
+      </p:pic>
+      <p:sp>
+        <p:nvSpPr>
+          <p:cNvPr id="23573" name="TextBox 23572">
+            <a:extLst>
+              <a:ext uri="{FF2B5EF4-FFF2-40B4-BE49-F238E27FC236}">
+                <a16:creationId xmlns:a16="http://schemas.microsoft.com/office/drawing/2014/main" id="{3353AE35-4531-E40F-7B12-3E468CC2BD4E}"/>
+              </a:ext>
+            </a:extLst>
+          </p:cNvPr>
+          <p:cNvSpPr txBox="1"/>
+          <p:nvPr/>
+        </p:nvSpPr>
+        <p:spPr>
+          <a:xfrm>
+            <a:off x="6869248" y="5207481"/>
+            <a:ext cx="852284" cy="338554"/>
+          </a:xfrm>
+          <a:prstGeom prst="rect">
+            <a:avLst/>
+          </a:prstGeom>
+          <a:noFill/>
+        </p:spPr>
+        <p:txBody>
+          <a:bodyPr wrap="square">
+            <a:spAutoFit/>
+          </a:bodyPr>
+          <a:lstStyle/>
+          <a:p>
+            <a:pPr marL="0" marR="0" lvl="0" indent="0" algn="ctr" defTabSz="914400" rtl="0" eaLnBrk="1" fontAlgn="auto" latinLnBrk="0" hangingPunct="1">
+              <a:lnSpc>
+                <a:spcPct val="100000"/>
+              </a:lnSpc>
+              <a:spcBef>
+                <a:spcPts val="0"/>
+              </a:spcBef>
+              <a:spcAft>
+                <a:spcPts val="0"/>
+              </a:spcAft>
+              <a:buClrTx/>
+              <a:buSzTx/>
+              <a:buFontTx/>
+              <a:buNone/>
+              <a:tabLst/>
+              <a:defRPr/>
+            </a:pPr>
+            <a:r>
+              <a:rPr kumimoji="0" lang="en-US" sz="800" b="0" i="0" u="none" strike="noStrike" kern="1200" cap="none" spc="0" normalizeH="0" baseline="0" noProof="0" dirty="0">
+                <a:ln>
+                  <a:noFill/>
+                </a:ln>
+                <a:solidFill>
+                  <a:prstClr val="black"/>
+                </a:solidFill>
+                <a:effectLst/>
+                <a:uLnTx/>
+                <a:uFillTx/>
+                <a:latin typeface="Segoe UI" panose="020B0502040204020203" pitchFamily="34" charset="0"/>
+                <a:ea typeface="+mn-ea"/>
+                <a:cs typeface="Segoe UI" panose="020B0502040204020203" pitchFamily="34" charset="0"/>
+              </a:rPr>
+              <a:t>Model Context Protocol</a:t>
+            </a:r>
+          </a:p>
+        </p:txBody>
+      </p:sp>
+      <p:sp>
+        <p:nvSpPr>
+          <p:cNvPr id="23574" name="TextBox 23573">
+            <a:extLst>
+              <a:ext uri="{FF2B5EF4-FFF2-40B4-BE49-F238E27FC236}">
+                <a16:creationId xmlns:a16="http://schemas.microsoft.com/office/drawing/2014/main" id="{5366805F-430D-4F82-91A8-1F3D0CAC620E}"/>
+              </a:ext>
+            </a:extLst>
+          </p:cNvPr>
+          <p:cNvSpPr txBox="1"/>
+          <p:nvPr/>
+        </p:nvSpPr>
+        <p:spPr>
+          <a:xfrm>
+            <a:off x="8265208" y="5248483"/>
+            <a:ext cx="604720" cy="215444"/>
+          </a:xfrm>
+          <a:prstGeom prst="rect">
+            <a:avLst/>
+          </a:prstGeom>
+          <a:noFill/>
+        </p:spPr>
+        <p:txBody>
+          <a:bodyPr wrap="square">
+            <a:spAutoFit/>
+          </a:bodyPr>
+          <a:lstStyle/>
+          <a:p>
+            <a:pPr marL="0" marR="0" lvl="0" indent="0" algn="ctr" defTabSz="914400" rtl="0" eaLnBrk="1" fontAlgn="auto" latinLnBrk="0" hangingPunct="1">
+              <a:lnSpc>
+                <a:spcPct val="100000"/>
+              </a:lnSpc>
+              <a:spcBef>
+                <a:spcPts val="0"/>
+              </a:spcBef>
+              <a:spcAft>
+                <a:spcPts val="0"/>
+              </a:spcAft>
+              <a:buClrTx/>
+              <a:buSzTx/>
+              <a:buFontTx/>
+              <a:buNone/>
+              <a:tabLst/>
+              <a:defRPr/>
+            </a:pPr>
+            <a:r>
+              <a:rPr kumimoji="0" lang="en-US" sz="800" b="0" i="0" u="none" strike="noStrike" kern="1200" cap="none" spc="0" normalizeH="0" baseline="0" noProof="0" dirty="0">
+                <a:ln>
+                  <a:noFill/>
+                </a:ln>
+                <a:solidFill>
+                  <a:prstClr val="black"/>
+                </a:solidFill>
+                <a:effectLst/>
+                <a:uLnTx/>
+                <a:uFillTx/>
+                <a:latin typeface="Segoe UI" panose="020B0502040204020203" pitchFamily="34" charset="0"/>
+                <a:ea typeface="+mn-ea"/>
+                <a:cs typeface="Segoe UI" panose="020B0502040204020203" pitchFamily="34" charset="0"/>
+              </a:rPr>
+              <a:t>C#</a:t>
+            </a:r>
+          </a:p>
+        </p:txBody>
+      </p:sp>
+      <p:pic>
+        <p:nvPicPr>
+          <p:cNvPr id="23579" name="Picture 23578">
+            <a:extLst>
+              <a:ext uri="{FF2B5EF4-FFF2-40B4-BE49-F238E27FC236}">
+                <a16:creationId xmlns:a16="http://schemas.microsoft.com/office/drawing/2014/main" id="{F7E20D59-5640-BF5B-A91A-90043C4C0B96}"/>
+              </a:ext>
+            </a:extLst>
+          </p:cNvPr>
+          <p:cNvPicPr>
+            <a:picLocks noChangeAspect="1"/>
+          </p:cNvPicPr>
+          <p:nvPr/>
+        </p:nvPicPr>
+        <p:blipFill>
+          <a:blip r:embed="rId10"/>
+          <a:stretch>
+            <a:fillRect/>
+          </a:stretch>
+        </p:blipFill>
+        <p:spPr>
+          <a:xfrm>
+            <a:off x="7013466" y="4478146"/>
+            <a:ext cx="364617" cy="407200"/>
+          </a:xfrm>
+          <a:prstGeom prst="rect">
+            <a:avLst/>
+          </a:prstGeom>
+        </p:spPr>
+      </p:pic>
+      <p:cxnSp>
+        <p:nvCxnSpPr>
+          <p:cNvPr id="23587" name="Straight Arrow Connector 23586">
+            <a:extLst>
+              <a:ext uri="{FF2B5EF4-FFF2-40B4-BE49-F238E27FC236}">
+                <a16:creationId xmlns:a16="http://schemas.microsoft.com/office/drawing/2014/main" id="{ED102961-5A6E-3C21-EE2E-DC6B7CD61FB8}"/>
+              </a:ext>
+            </a:extLst>
+          </p:cNvPr>
+          <p:cNvCxnSpPr>
+            <a:stCxn id="48" idx="2"/>
+            <a:endCxn id="23563" idx="1"/>
+          </p:cNvCxnSpPr>
+          <p:nvPr/>
+        </p:nvCxnSpPr>
+        <p:spPr>
+          <a:xfrm>
+            <a:off x="4168230" y="3074989"/>
+            <a:ext cx="2766510" cy="1903449"/>
+          </a:xfrm>
+          <a:prstGeom prst="straightConnector1">
+            <a:avLst/>
+          </a:prstGeom>
+          <a:ln>
+            <a:solidFill>
+              <a:schemeClr val="tx1"/>
+            </a:solidFill>
+            <a:prstDash val="lgDash"/>
+            <a:tailEnd type="triangle"/>
+          </a:ln>
+        </p:spPr>
+        <p:style>
+          <a:lnRef idx="2">
+            <a:schemeClr val="accent1"/>
+          </a:lnRef>
+          <a:fillRef idx="0">
+            <a:schemeClr val="accent1"/>
+          </a:fillRef>
+          <a:effectRef idx="1">
+            <a:schemeClr val="accent1"/>
+          </a:effectRef>
+          <a:fontRef idx="minor">
+            <a:schemeClr val="tx1"/>
+          </a:fontRef>
+        </p:style>
+      </p:cxnSp>
+      <p:cxnSp>
+        <p:nvCxnSpPr>
+          <p:cNvPr id="23594" name="Connector: Curved 23593">
+            <a:extLst>
+              <a:ext uri="{FF2B5EF4-FFF2-40B4-BE49-F238E27FC236}">
+                <a16:creationId xmlns:a16="http://schemas.microsoft.com/office/drawing/2014/main" id="{F50210A3-E814-01B1-1FB9-87E06A28EC61}"/>
+              </a:ext>
+            </a:extLst>
+          </p:cNvPr>
+          <p:cNvCxnSpPr>
+            <a:stCxn id="54" idx="2"/>
+            <a:endCxn id="23557" idx="1"/>
+          </p:cNvCxnSpPr>
+          <p:nvPr/>
+        </p:nvCxnSpPr>
+        <p:spPr>
+          <a:xfrm rot="16200000" flipH="1">
+            <a:off x="6650302" y="3080457"/>
+            <a:ext cx="380573" cy="669859"/>
+          </a:xfrm>
+          <a:prstGeom prst="curvedConnector3">
+            <a:avLst/>
+          </a:prstGeom>
+          <a:ln>
+            <a:solidFill>
+              <a:srgbClr val="0070C0"/>
+            </a:solidFill>
+            <a:prstDash val="lgDash"/>
+            <a:tailEnd type="triangle"/>
+          </a:ln>
+        </p:spPr>
+        <p:style>
+          <a:lnRef idx="2">
+            <a:schemeClr val="accent1"/>
+          </a:lnRef>
+          <a:fillRef idx="0">
+            <a:schemeClr val="accent1"/>
+          </a:fillRef>
+          <a:effectRef idx="1">
+            <a:schemeClr val="accent1"/>
+          </a:effectRef>
+          <a:fontRef idx="minor">
+            <a:schemeClr val="tx1"/>
+          </a:fontRef>
+        </p:style>
+      </p:cxnSp>
+      <p:cxnSp>
+        <p:nvCxnSpPr>
+          <p:cNvPr id="23598" name="Straight Arrow Connector 23597">
+            <a:extLst>
+              <a:ext uri="{FF2B5EF4-FFF2-40B4-BE49-F238E27FC236}">
+                <a16:creationId xmlns:a16="http://schemas.microsoft.com/office/drawing/2014/main" id="{A9E558AF-6893-2094-4A1C-79FA5B608BE3}"/>
+              </a:ext>
+            </a:extLst>
+          </p:cNvPr>
+          <p:cNvCxnSpPr>
+            <a:cxnSpLocks/>
+            <a:stCxn id="5" idx="3"/>
+            <a:endCxn id="58" idx="1"/>
+          </p:cNvCxnSpPr>
+          <p:nvPr/>
+        </p:nvCxnSpPr>
+        <p:spPr>
+          <a:xfrm>
+            <a:off x="7529437" y="2661858"/>
+            <a:ext cx="639596" cy="0"/>
+          </a:xfrm>
+          <a:prstGeom prst="straightConnector1">
+            <a:avLst/>
+          </a:prstGeom>
+          <a:ln>
+            <a:headEnd type="triangle"/>
+            <a:tailEnd type="triangle"/>
+          </a:ln>
+        </p:spPr>
+        <p:style>
+          <a:lnRef idx="2">
+            <a:schemeClr val="dk1"/>
+          </a:lnRef>
+          <a:fillRef idx="0">
+            <a:schemeClr val="dk1"/>
+          </a:fillRef>
+          <a:effectRef idx="1">
+            <a:schemeClr val="dk1"/>
+          </a:effectRef>
+          <a:fontRef idx="minor">
+            <a:schemeClr val="tx1"/>
+          </a:fontRef>
+        </p:style>
+      </p:cxnSp>
+      <p:sp>
+        <p:nvSpPr>
+          <p:cNvPr id="23601" name="TextBox 23600">
+            <a:extLst>
+              <a:ext uri="{FF2B5EF4-FFF2-40B4-BE49-F238E27FC236}">
+                <a16:creationId xmlns:a16="http://schemas.microsoft.com/office/drawing/2014/main" id="{5A5F7833-D719-08BD-7899-DF28683109B7}"/>
+              </a:ext>
+            </a:extLst>
+          </p:cNvPr>
+          <p:cNvSpPr txBox="1"/>
+          <p:nvPr/>
+        </p:nvSpPr>
+        <p:spPr>
+          <a:xfrm>
+            <a:off x="4969178" y="3982901"/>
+            <a:ext cx="795129" cy="430887"/>
+          </a:xfrm>
+          <a:prstGeom prst="rect">
+            <a:avLst/>
+          </a:prstGeom>
+          <a:noFill/>
+        </p:spPr>
+        <p:txBody>
+          <a:bodyPr wrap="square">
+            <a:spAutoFit/>
+          </a:bodyPr>
+          <a:lstStyle/>
+          <a:p>
+            <a:pPr marL="0" marR="0" lvl="0" indent="0" algn="ctr" defTabSz="914400" rtl="0" eaLnBrk="1" fontAlgn="auto" latinLnBrk="0" hangingPunct="1">
+              <a:lnSpc>
+                <a:spcPct val="100000"/>
+              </a:lnSpc>
+              <a:spcBef>
+                <a:spcPts val="0"/>
+              </a:spcBef>
+              <a:spcAft>
+                <a:spcPts val="0"/>
+              </a:spcAft>
+              <a:buClrTx/>
+              <a:buSzTx/>
+              <a:buFontTx/>
+              <a:buNone/>
+              <a:tabLst/>
+              <a:defRPr/>
+            </a:pPr>
+            <a:r>
+              <a:rPr kumimoji="0" lang="en-US" sz="1050" b="0" i="0" u="none" strike="noStrike" kern="1200" cap="none" spc="0" normalizeH="0" baseline="0" noProof="0" dirty="0">
+                <a:ln>
+                  <a:noFill/>
+                </a:ln>
+                <a:solidFill>
+                  <a:prstClr val="black"/>
+                </a:solidFill>
+                <a:effectLst/>
+                <a:uLnTx/>
+                <a:uFillTx/>
+                <a:latin typeface="Segoe UI" panose="020B0502040204020203" pitchFamily="34" charset="0"/>
+                <a:ea typeface="+mn-ea"/>
+                <a:cs typeface="Segoe UI" panose="020B0502040204020203" pitchFamily="34" charset="0"/>
+              </a:rPr>
+              <a:t>MCP</a:t>
+            </a:r>
+          </a:p>
+          <a:p>
+            <a:pPr marL="0" marR="0" lvl="0" indent="0" algn="ctr" defTabSz="914400" rtl="0" eaLnBrk="1" fontAlgn="auto" latinLnBrk="0" hangingPunct="1">
+              <a:lnSpc>
+                <a:spcPct val="100000"/>
+              </a:lnSpc>
+              <a:spcBef>
+                <a:spcPts val="0"/>
+              </a:spcBef>
+              <a:spcAft>
+                <a:spcPts val="0"/>
+              </a:spcAft>
+              <a:buClrTx/>
+              <a:buSzTx/>
+              <a:buFontTx/>
+              <a:buNone/>
+              <a:tabLst/>
+              <a:defRPr/>
+            </a:pPr>
+            <a:r>
+              <a:rPr kumimoji="0" lang="en-US" sz="1050" b="0" i="0" u="none" strike="noStrike" kern="1200" cap="none" spc="0" normalizeH="0" baseline="0" noProof="0" dirty="0">
+                <a:ln>
+                  <a:noFill/>
+                </a:ln>
+                <a:solidFill>
+                  <a:prstClr val="black"/>
+                </a:solidFill>
+                <a:effectLst/>
+                <a:uLnTx/>
+                <a:uFillTx/>
+                <a:latin typeface="Segoe UI" panose="020B0502040204020203" pitchFamily="34" charset="0"/>
+                <a:ea typeface="+mn-ea"/>
+                <a:cs typeface="Segoe UI" panose="020B0502040204020203" pitchFamily="34" charset="0"/>
+              </a:rPr>
+              <a:t>(stdio)</a:t>
+            </a:r>
+          </a:p>
+        </p:txBody>
+      </p:sp>
+      <p:cxnSp>
+        <p:nvCxnSpPr>
+          <p:cNvPr id="23604" name="Straight Arrow Connector 23603">
+            <a:extLst>
+              <a:ext uri="{FF2B5EF4-FFF2-40B4-BE49-F238E27FC236}">
+                <a16:creationId xmlns:a16="http://schemas.microsoft.com/office/drawing/2014/main" id="{E26C043C-3EAA-5E9F-2A55-E0F45E6B145E}"/>
+              </a:ext>
+            </a:extLst>
+          </p:cNvPr>
+          <p:cNvCxnSpPr>
+            <a:cxnSpLocks/>
+            <a:stCxn id="55" idx="2"/>
+          </p:cNvCxnSpPr>
+          <p:nvPr/>
+        </p:nvCxnSpPr>
+        <p:spPr>
+          <a:xfrm>
+            <a:off x="5842626" y="3229455"/>
+            <a:ext cx="1170840" cy="1239153"/>
+          </a:xfrm>
+          <a:prstGeom prst="straightConnector1">
+            <a:avLst/>
+          </a:prstGeom>
+          <a:ln>
+            <a:solidFill>
+              <a:schemeClr val="tx1"/>
+            </a:solidFill>
+            <a:tailEnd type="triangle"/>
+          </a:ln>
+        </p:spPr>
+        <p:style>
+          <a:lnRef idx="2">
+            <a:schemeClr val="accent1"/>
+          </a:lnRef>
+          <a:fillRef idx="0">
+            <a:schemeClr val="accent1"/>
+          </a:fillRef>
+          <a:effectRef idx="1">
+            <a:schemeClr val="accent1"/>
+          </a:effectRef>
+          <a:fontRef idx="minor">
+            <a:schemeClr val="tx1"/>
+          </a:fontRef>
+        </p:style>
+      </p:cxnSp>
+      <p:sp>
+        <p:nvSpPr>
+          <p:cNvPr id="3" name="TextBox 2">
+            <a:extLst>
+              <a:ext uri="{FF2B5EF4-FFF2-40B4-BE49-F238E27FC236}">
+                <a16:creationId xmlns:a16="http://schemas.microsoft.com/office/drawing/2014/main" id="{12F81E7F-3CC4-87DA-C508-EA446E2AC180}"/>
+              </a:ext>
+            </a:extLst>
+          </p:cNvPr>
+          <p:cNvSpPr txBox="1"/>
+          <p:nvPr/>
+        </p:nvSpPr>
+        <p:spPr>
+          <a:xfrm>
+            <a:off x="5849167" y="3748867"/>
+            <a:ext cx="795129" cy="430887"/>
+          </a:xfrm>
+          <a:prstGeom prst="rect">
+            <a:avLst/>
+          </a:prstGeom>
+          <a:noFill/>
+        </p:spPr>
+        <p:txBody>
+          <a:bodyPr wrap="square">
+            <a:spAutoFit/>
+          </a:bodyPr>
+          <a:lstStyle/>
+          <a:p>
+            <a:pPr marL="0" marR="0" lvl="0" indent="0" algn="ctr" defTabSz="914400" rtl="0" eaLnBrk="1" fontAlgn="auto" latinLnBrk="0" hangingPunct="1">
+              <a:lnSpc>
+                <a:spcPct val="100000"/>
+              </a:lnSpc>
+              <a:spcBef>
+                <a:spcPts val="0"/>
+              </a:spcBef>
+              <a:spcAft>
+                <a:spcPts val="0"/>
+              </a:spcAft>
+              <a:buClrTx/>
+              <a:buSzTx/>
+              <a:buFontTx/>
+              <a:buNone/>
+              <a:tabLst/>
+              <a:defRPr/>
+            </a:pPr>
+            <a:r>
+              <a:rPr kumimoji="0" lang="en-US" sz="1050" b="0" i="0" u="none" strike="noStrike" kern="1200" cap="none" spc="0" normalizeH="0" baseline="0" noProof="0" dirty="0">
+                <a:ln>
+                  <a:noFill/>
+                </a:ln>
+                <a:solidFill>
+                  <a:prstClr val="black"/>
+                </a:solidFill>
+                <a:effectLst/>
+                <a:uLnTx/>
+                <a:uFillTx/>
+                <a:latin typeface="Segoe UI" panose="020B0502040204020203" pitchFamily="34" charset="0"/>
+                <a:ea typeface="+mn-ea"/>
+                <a:cs typeface="Segoe UI" panose="020B0502040204020203" pitchFamily="34" charset="0"/>
+              </a:rPr>
+              <a:t>MCP</a:t>
+            </a:r>
+          </a:p>
+          <a:p>
+            <a:pPr marL="0" marR="0" lvl="0" indent="0" algn="ctr" defTabSz="914400" rtl="0" eaLnBrk="1" fontAlgn="auto" latinLnBrk="0" hangingPunct="1">
+              <a:lnSpc>
+                <a:spcPct val="100000"/>
+              </a:lnSpc>
+              <a:spcBef>
+                <a:spcPts val="0"/>
+              </a:spcBef>
+              <a:spcAft>
+                <a:spcPts val="0"/>
+              </a:spcAft>
+              <a:buClrTx/>
+              <a:buSzTx/>
+              <a:buFontTx/>
+              <a:buNone/>
+              <a:tabLst/>
+              <a:defRPr/>
+            </a:pPr>
+            <a:r>
+              <a:rPr kumimoji="0" lang="en-US" sz="1050" b="0" i="0" u="none" strike="noStrike" kern="1200" cap="none" spc="0" normalizeH="0" baseline="0" noProof="0" dirty="0">
+                <a:ln>
+                  <a:noFill/>
+                </a:ln>
+                <a:solidFill>
+                  <a:prstClr val="black"/>
+                </a:solidFill>
+                <a:effectLst/>
+                <a:uLnTx/>
+                <a:uFillTx/>
+                <a:latin typeface="Segoe UI" panose="020B0502040204020203" pitchFamily="34" charset="0"/>
+                <a:ea typeface="+mn-ea"/>
+                <a:cs typeface="Segoe UI" panose="020B0502040204020203" pitchFamily="34" charset="0"/>
+              </a:rPr>
+              <a:t>(stdio)</a:t>
+            </a:r>
+          </a:p>
+        </p:txBody>
+      </p:sp>
+      <p:sp>
+        <p:nvSpPr>
+          <p:cNvPr id="6" name="TextBox 5">
+            <a:extLst>
+              <a:ext uri="{FF2B5EF4-FFF2-40B4-BE49-F238E27FC236}">
+                <a16:creationId xmlns:a16="http://schemas.microsoft.com/office/drawing/2014/main" id="{07DF1C9A-6FAC-1F2A-4EB9-B0897DE45353}"/>
+              </a:ext>
+            </a:extLst>
+          </p:cNvPr>
+          <p:cNvSpPr txBox="1"/>
+          <p:nvPr/>
+        </p:nvSpPr>
+        <p:spPr>
+          <a:xfrm>
+            <a:off x="4279633" y="3644520"/>
+            <a:ext cx="899948" cy="415498"/>
+          </a:xfrm>
+          <a:prstGeom prst="rect">
+            <a:avLst/>
+          </a:prstGeom>
+          <a:noFill/>
+        </p:spPr>
+        <p:txBody>
+          <a:bodyPr wrap="square">
+            <a:spAutoFit/>
+          </a:bodyPr>
+          <a:lstStyle/>
+          <a:p>
+            <a:pPr marL="0" marR="0" lvl="0" indent="0" algn="ctr" defTabSz="914400" rtl="0" eaLnBrk="1" fontAlgn="auto" latinLnBrk="0" hangingPunct="1">
+              <a:lnSpc>
+                <a:spcPct val="100000"/>
+              </a:lnSpc>
+              <a:spcBef>
+                <a:spcPts val="0"/>
+              </a:spcBef>
+              <a:spcAft>
+                <a:spcPts val="0"/>
+              </a:spcAft>
+              <a:buClrTx/>
+              <a:buSzTx/>
+              <a:buFontTx/>
+              <a:buNone/>
+              <a:tabLst/>
+              <a:defRPr/>
+            </a:pPr>
+            <a:r>
+              <a:rPr kumimoji="0" lang="en-US" sz="1050" b="0" i="0" u="none" strike="noStrike" kern="1200" cap="none" spc="0" normalizeH="0" baseline="0" noProof="0" dirty="0">
+                <a:ln>
+                  <a:noFill/>
+                </a:ln>
+                <a:solidFill>
+                  <a:prstClr val="black"/>
+                </a:solidFill>
+                <a:effectLst/>
+                <a:uLnTx/>
+                <a:uFillTx/>
+                <a:latin typeface="Segoe UI" panose="020B0502040204020203" pitchFamily="34" charset="0"/>
+                <a:ea typeface="+mn-ea"/>
+                <a:cs typeface="Segoe UI" panose="020B0502040204020203" pitchFamily="34" charset="0"/>
+              </a:rPr>
+              <a:t>Optional</a:t>
+            </a:r>
+          </a:p>
+          <a:p>
+            <a:pPr marL="0" marR="0" lvl="0" indent="0" algn="ctr" defTabSz="914400" rtl="0" eaLnBrk="1" fontAlgn="auto" latinLnBrk="0" hangingPunct="1">
+              <a:lnSpc>
+                <a:spcPct val="100000"/>
+              </a:lnSpc>
+              <a:spcBef>
+                <a:spcPts val="0"/>
+              </a:spcBef>
+              <a:spcAft>
+                <a:spcPts val="0"/>
+              </a:spcAft>
+              <a:buClrTx/>
+              <a:buSzTx/>
+              <a:buFontTx/>
+              <a:buNone/>
+              <a:tabLst/>
+              <a:defRPr/>
+            </a:pPr>
+            <a:r>
+              <a:rPr lang="en-US" sz="1050" dirty="0">
+                <a:solidFill>
+                  <a:prstClr val="black"/>
+                </a:solidFill>
+                <a:latin typeface="Segoe UI" panose="020B0502040204020203" pitchFamily="34" charset="0"/>
+                <a:cs typeface="Segoe UI" panose="020B0502040204020203" pitchFamily="34" charset="0"/>
+              </a:rPr>
+              <a:t>For testing</a:t>
+            </a:r>
+            <a:endParaRPr kumimoji="0" lang="en-US" sz="1050" b="0" i="0" u="none" strike="noStrike" kern="1200" cap="none" spc="0" normalizeH="0" baseline="0" noProof="0" dirty="0">
+              <a:ln>
+                <a:noFill/>
+              </a:ln>
+              <a:solidFill>
+                <a:prstClr val="black"/>
+              </a:solidFill>
+              <a:effectLst/>
+              <a:uLnTx/>
+              <a:uFillTx/>
+              <a:latin typeface="Segoe UI" panose="020B0502040204020203" pitchFamily="34" charset="0"/>
+              <a:ea typeface="+mn-ea"/>
+              <a:cs typeface="Segoe UI" panose="020B0502040204020203" pitchFamily="34" charset="0"/>
+            </a:endParaRPr>
+          </a:p>
+        </p:txBody>
+      </p:sp>
+    </p:spTree>
+    <p:extLst>
+      <p:ext uri="{BB962C8B-B14F-4D97-AF65-F5344CB8AC3E}">
+        <p14:creationId xmlns:p14="http://schemas.microsoft.com/office/powerpoint/2010/main" val="403181407"/>
+      </p:ext>
+    </p:extLst>
+  </p:cSld>
+  <p:clrMapOvr>
+    <a:masterClrMapping/>
+  </p:clrMapOvr>
+</p:sld>
+</file>
+
+<file path=ppt/slides/slide2.xml><?xml version="1.0" encoding="utf-8"?>
+<p:sld xmlns:a="http://schemas.openxmlformats.org/drawingml/2006/main" xmlns:r="http://schemas.openxmlformats.org/officeDocument/2006/relationships" xmlns:p="http://schemas.openxmlformats.org/presentationml/2006/main">
+  <p:cSld>
+    <p:spTree>
+      <p:nvGrpSpPr>
+        <p:cNvPr id="1" name="">
+          <a:extLst>
+            <a:ext uri="{FF2B5EF4-FFF2-40B4-BE49-F238E27FC236}">
               <a16:creationId xmlns:a16="http://schemas.microsoft.com/office/drawing/2014/main" id="{B48D643C-8191-3565-FBE1-7ADF55EBB56A}"/>
             </a:ext>
           </a:extLst>
@@ -3810,8 +6963,8 @@
         </p:nvSpPr>
         <p:spPr>
           <a:xfrm>
-            <a:off x="1387685" y="229111"/>
-            <a:ext cx="9144000" cy="750709"/>
+            <a:off x="755374" y="229111"/>
+            <a:ext cx="10567135" cy="750709"/>
           </a:xfrm>
         </p:spPr>
         <p:txBody>
@@ -3825,7 +6978,7 @@
                 <a:latin typeface="Segoe UI" panose="020B0502040204020203" pitchFamily="34" charset="0"/>
                 <a:cs typeface="Segoe UI" panose="020B0502040204020203" pitchFamily="34" charset="0"/>
               </a:rPr>
-              <a:t>Prototype/POC Architecture Diagram</a:t>
+              <a:t>VNext - Prototype/POC Architecture Diagram</a:t>
             </a:r>
           </a:p>
         </p:txBody>

</xml_diff>

<commit_message>
Architecture diagrams and image updates
</commit_message>
<xml_diff>
--- a/docs/simplified-directions/Prototype-Architecture-Diagrams.pptx
+++ b/docs/simplified-directions/Prototype-Architecture-Diagrams.pptx
@@ -5416,7 +5416,7 @@
         <p:spPr>
           <a:xfrm>
             <a:off x="8733258" y="2097208"/>
-            <a:ext cx="1471172" cy="492443"/>
+            <a:ext cx="1471172" cy="630942"/>
           </a:xfrm>
           <a:prstGeom prst="rect">
             <a:avLst/>
@@ -5479,6 +5479,21 @@
               <a:t>Chat Agent</a:t>
             </a:r>
           </a:p>
+          <a:p>
+            <a:pPr algn="ctr"/>
+            <a:r>
+              <a:rPr lang="en-US" sz="900" dirty="0">
+                <a:solidFill>
+                  <a:prstClr val="white">
+                    <a:lumMod val="50000"/>
+                  </a:prstClr>
+                </a:solidFill>
+                <a:latin typeface="Segoe UI" panose="020B0502040204020203" pitchFamily="34" charset="0"/>
+                <a:cs typeface="Segoe UI" panose="020B0502040204020203" pitchFamily="34" charset="0"/>
+              </a:rPr>
+              <a:t>(ChatCompletionAgent)</a:t>
+            </a:r>
+          </a:p>
         </p:txBody>
       </p:sp>
       <p:pic>
@@ -5550,7 +5565,7 @@
         </p:blipFill>
         <p:spPr bwMode="auto">
           <a:xfrm>
-            <a:off x="8788874" y="2673417"/>
+            <a:off x="8788874" y="2696567"/>
             <a:ext cx="200765" cy="258486"/>
           </a:xfrm>
           <a:prstGeom prst="rect">
@@ -5597,7 +5612,7 @@
         </p:blipFill>
         <p:spPr bwMode="auto">
           <a:xfrm>
-            <a:off x="9337001" y="2677537"/>
+            <a:off x="9337001" y="2700687"/>
             <a:ext cx="261889" cy="261889"/>
           </a:xfrm>
           <a:prstGeom prst="rect">
@@ -5629,7 +5644,7 @@
         </p:nvSpPr>
         <p:spPr>
           <a:xfrm>
-            <a:off x="8577839" y="2886547"/>
+            <a:off x="8577839" y="2909697"/>
             <a:ext cx="604720" cy="338554"/>
           </a:xfrm>
           <a:prstGeom prst="rect">
@@ -5730,7 +5745,7 @@
         </p:nvSpPr>
         <p:spPr>
           <a:xfrm>
-            <a:off x="9186984" y="2931903"/>
+            <a:off x="9186984" y="2955053"/>
             <a:ext cx="604720" cy="215444"/>
           </a:xfrm>
           <a:prstGeom prst="rect">

</xml_diff>

<commit_message>
Added minor changes to TODO
</commit_message>
<xml_diff>
--- a/docs/simplified-directions/Prototype-Architecture-Diagrams.pptx
+++ b/docs/simplified-directions/Prototype-Architecture-Diagrams.pptx
@@ -198,7 +198,7 @@
           <a:p>
             <a:fld id="{17C0FFDD-2F91-4327-83DF-AC11DEFCAA33}" type="datetimeFigureOut">
               <a:rPr lang="en-US" smtClean="0"/>
-              <a:t>9/15/2025</a:t>
+              <a:t>9/16/2025</a:t>
             </a:fld>
             <a:endParaRPr lang="en-US"/>
           </a:p>
@@ -902,7 +902,7 @@
           <a:p>
             <a:fld id="{F3562317-0748-4C3E-8EEC-4AF870B98677}" type="datetimeFigureOut">
               <a:rPr lang="en-US" smtClean="0"/>
-              <a:t>9/15/2025</a:t>
+              <a:t>9/16/2025</a:t>
             </a:fld>
             <a:endParaRPr lang="en-US"/>
           </a:p>
@@ -1100,7 +1100,7 @@
           <a:p>
             <a:fld id="{F3562317-0748-4C3E-8EEC-4AF870B98677}" type="datetimeFigureOut">
               <a:rPr lang="en-US" smtClean="0"/>
-              <a:t>9/15/2025</a:t>
+              <a:t>9/16/2025</a:t>
             </a:fld>
             <a:endParaRPr lang="en-US"/>
           </a:p>
@@ -1308,7 +1308,7 @@
           <a:p>
             <a:fld id="{F3562317-0748-4C3E-8EEC-4AF870B98677}" type="datetimeFigureOut">
               <a:rPr lang="en-US" smtClean="0"/>
-              <a:t>9/15/2025</a:t>
+              <a:t>9/16/2025</a:t>
             </a:fld>
             <a:endParaRPr lang="en-US"/>
           </a:p>
@@ -1506,7 +1506,7 @@
           <a:p>
             <a:fld id="{F3562317-0748-4C3E-8EEC-4AF870B98677}" type="datetimeFigureOut">
               <a:rPr lang="en-US" smtClean="0"/>
-              <a:t>9/15/2025</a:t>
+              <a:t>9/16/2025</a:t>
             </a:fld>
             <a:endParaRPr lang="en-US"/>
           </a:p>
@@ -1781,7 +1781,7 @@
           <a:p>
             <a:fld id="{F3562317-0748-4C3E-8EEC-4AF870B98677}" type="datetimeFigureOut">
               <a:rPr lang="en-US" smtClean="0"/>
-              <a:t>9/15/2025</a:t>
+              <a:t>9/16/2025</a:t>
             </a:fld>
             <a:endParaRPr lang="en-US"/>
           </a:p>
@@ -2046,7 +2046,7 @@
           <a:p>
             <a:fld id="{F3562317-0748-4C3E-8EEC-4AF870B98677}" type="datetimeFigureOut">
               <a:rPr lang="en-US" smtClean="0"/>
-              <a:t>9/15/2025</a:t>
+              <a:t>9/16/2025</a:t>
             </a:fld>
             <a:endParaRPr lang="en-US"/>
           </a:p>
@@ -2458,7 +2458,7 @@
           <a:p>
             <a:fld id="{F3562317-0748-4C3E-8EEC-4AF870B98677}" type="datetimeFigureOut">
               <a:rPr lang="en-US" smtClean="0"/>
-              <a:t>9/15/2025</a:t>
+              <a:t>9/16/2025</a:t>
             </a:fld>
             <a:endParaRPr lang="en-US"/>
           </a:p>
@@ -2599,7 +2599,7 @@
           <a:p>
             <a:fld id="{F3562317-0748-4C3E-8EEC-4AF870B98677}" type="datetimeFigureOut">
               <a:rPr lang="en-US" smtClean="0"/>
-              <a:t>9/15/2025</a:t>
+              <a:t>9/16/2025</a:t>
             </a:fld>
             <a:endParaRPr lang="en-US"/>
           </a:p>
@@ -2712,7 +2712,7 @@
           <a:p>
             <a:fld id="{F3562317-0748-4C3E-8EEC-4AF870B98677}" type="datetimeFigureOut">
               <a:rPr lang="en-US" smtClean="0"/>
-              <a:t>9/15/2025</a:t>
+              <a:t>9/16/2025</a:t>
             </a:fld>
             <a:endParaRPr lang="en-US"/>
           </a:p>
@@ -3023,7 +3023,7 @@
           <a:p>
             <a:fld id="{F3562317-0748-4C3E-8EEC-4AF870B98677}" type="datetimeFigureOut">
               <a:rPr lang="en-US" smtClean="0"/>
-              <a:t>9/15/2025</a:t>
+              <a:t>9/16/2025</a:t>
             </a:fld>
             <a:endParaRPr lang="en-US"/>
           </a:p>
@@ -3311,7 +3311,7 @@
           <a:p>
             <a:fld id="{F3562317-0748-4C3E-8EEC-4AF870B98677}" type="datetimeFigureOut">
               <a:rPr lang="en-US" smtClean="0"/>
-              <a:t>9/15/2025</a:t>
+              <a:t>9/16/2025</a:t>
             </a:fld>
             <a:endParaRPr lang="en-US"/>
           </a:p>
@@ -3552,7 +3552,7 @@
           <a:p>
             <a:fld id="{F3562317-0748-4C3E-8EEC-4AF870B98677}" type="datetimeFigureOut">
               <a:rPr lang="en-US" smtClean="0"/>
-              <a:t>9/15/2025</a:t>
+              <a:t>9/16/2025</a:t>
             </a:fld>
             <a:endParaRPr lang="en-US"/>
           </a:p>

</xml_diff>

<commit_message>
STEP #1 - Move temp-word-docs into docs-journey-log and update memory reference
</commit_message>
<xml_diff>
--- a/docs/simplified-directions/Prototype-Architecture-Diagrams.pptx
+++ b/docs/simplified-directions/Prototype-Architecture-Diagrams.pptx
@@ -4133,7 +4133,7 @@
               </a:rPr>
             </a:br>
             <a:r>
-              <a:rPr lang="en-US" sz="3100" dirty="0">
+              <a:rPr lang="en-US" sz="2700" dirty="0">
                 <a:latin typeface="Segoe UI" panose="020B0502040204020203" pitchFamily="34" charset="0"/>
                 <a:cs typeface="Segoe UI" panose="020B0502040204020203" pitchFamily="34" charset="0"/>
               </a:rPr>
@@ -7671,8 +7671,8 @@
         </p:nvSpPr>
         <p:spPr>
           <a:xfrm>
-            <a:off x="812432" y="316849"/>
-            <a:ext cx="10567135" cy="750709"/>
+            <a:off x="812432" y="67021"/>
+            <a:ext cx="10567135" cy="1000538"/>
           </a:xfrm>
         </p:spPr>
         <p:txBody>
@@ -7686,7 +7686,7 @@
                 <a:latin typeface="Segoe UI" panose="020B0502040204020203" pitchFamily="34" charset="0"/>
                 <a:cs typeface="Segoe UI" panose="020B0502040204020203" pitchFamily="34" charset="0"/>
               </a:rPr>
-              <a:t>MVP - Architecture Diagram</a:t>
+              <a:t>Dockerized - Architecture Diagram</a:t>
             </a:r>
             <a:br>
               <a:rPr lang="en-US" sz="4000" dirty="0">
@@ -7695,7 +7695,7 @@
               </a:rPr>
             </a:br>
             <a:r>
-              <a:rPr lang="en-US" sz="3100" dirty="0">
+              <a:rPr lang="en-US" sz="2700" dirty="0">
                 <a:latin typeface="Segoe UI" panose="020B0502040204020203" pitchFamily="34" charset="0"/>
                 <a:cs typeface="Segoe UI" panose="020B0502040204020203" pitchFamily="34" charset="0"/>
               </a:rPr>
@@ -10857,7 +10857,7 @@
                 <a:latin typeface="Segoe UI" panose="020B0502040204020203" pitchFamily="34" charset="0"/>
                 <a:cs typeface="Segoe UI" panose="020B0502040204020203" pitchFamily="34" charset="0"/>
               </a:rPr>
-              <a:t>“Production” - Architecture Diagram</a:t>
+              <a:t>Cloud-Native - Architecture Diagram</a:t>
             </a:r>
             <a:br>
               <a:rPr lang="en-US" sz="4000" dirty="0">
@@ -10866,11 +10866,11 @@
               </a:rPr>
             </a:br>
             <a:r>
-              <a:rPr lang="en-US" sz="3100" dirty="0">
+              <a:rPr lang="en-US" sz="2700" dirty="0">
                 <a:latin typeface="Segoe UI" panose="020B0502040204020203" pitchFamily="34" charset="0"/>
                 <a:cs typeface="Segoe UI" panose="020B0502040204020203" pitchFamily="34" charset="0"/>
               </a:rPr>
-              <a:t>(Decoupled Agents/MCP-servers containers in Kubernetes/Azure [*])</a:t>
+              <a:t>(Decoupled Agents / MCP servers as containers in Kubernetes/Azure [*])</a:t>
             </a:r>
             <a:endParaRPr lang="en-US" sz="4000" dirty="0">
               <a:latin typeface="Segoe UI" panose="020B0502040204020203" pitchFamily="34" charset="0"/>
@@ -13741,8 +13741,8 @@
         </p:nvSpPr>
         <p:spPr>
           <a:xfrm>
-            <a:off x="888537" y="6382071"/>
-            <a:ext cx="10787269" cy="307777"/>
+            <a:off x="1117325" y="6382071"/>
+            <a:ext cx="9800643" cy="276999"/>
           </a:xfrm>
           <a:prstGeom prst="rect">
             <a:avLst/>
@@ -13756,41 +13756,41 @@
           <a:lstStyle/>
           <a:p>
             <a:r>
-              <a:rPr lang="en-US" sz="1400" dirty="0">
+              <a:rPr lang="en-US" sz="1200" dirty="0">
                 <a:latin typeface="Segoe UI" panose="020B0502040204020203" pitchFamily="34" charset="0"/>
                 <a:cs typeface="Segoe UI" panose="020B0502040204020203" pitchFamily="34" charset="0"/>
               </a:rPr>
               <a:t>[*] Deployment in Azure could be </a:t>
             </a:r>
             <a:r>
-              <a:rPr lang="en-US" sz="1400" b="1" dirty="0">
+              <a:rPr lang="en-US" sz="1200" b="1" dirty="0">
                 <a:latin typeface="Segoe UI" panose="020B0502040204020203" pitchFamily="34" charset="0"/>
                 <a:cs typeface="Segoe UI" panose="020B0502040204020203" pitchFamily="34" charset="0"/>
               </a:rPr>
               <a:t>Azure Kubernetes Service (AKS)</a:t>
             </a:r>
             <a:r>
-              <a:rPr lang="en-US" sz="1400" dirty="0">
+              <a:rPr lang="en-US" sz="1200" dirty="0">
                 <a:latin typeface="Segoe UI" panose="020B0502040204020203" pitchFamily="34" charset="0"/>
                 <a:cs typeface="Segoe UI" panose="020B0502040204020203" pitchFamily="34" charset="0"/>
               </a:rPr>
               <a:t> or </a:t>
             </a:r>
             <a:r>
-              <a:rPr lang="en-US" sz="1400" b="1" dirty="0">
+              <a:rPr lang="en-US" sz="1200" b="1" dirty="0">
                 <a:latin typeface="Segoe UI" panose="020B0502040204020203" pitchFamily="34" charset="0"/>
                 <a:cs typeface="Segoe UI" panose="020B0502040204020203" pitchFamily="34" charset="0"/>
               </a:rPr>
-              <a:t>Azure Container Apps</a:t>
-            </a:r>
-            <a:r>
-              <a:rPr lang="en-US" sz="1400" dirty="0">
+              <a:t>Azure Container Apps (ACA)</a:t>
+            </a:r>
+            <a:r>
+              <a:rPr lang="en-US" sz="1200" dirty="0">
                 <a:latin typeface="Segoe UI" panose="020B0502040204020203" pitchFamily="34" charset="0"/>
                 <a:cs typeface="Segoe UI" panose="020B0502040204020203" pitchFamily="34" charset="0"/>
               </a:rPr>
               <a:t>, depending on the system’s complexity.</a:t>
             </a:r>
-            <a:endParaRPr lang="en-US" sz="1400" dirty="0"/>
+            <a:endParaRPr lang="en-US" sz="1200" dirty="0"/>
           </a:p>
         </p:txBody>
       </p:sp>

</xml_diff>